<commit_message>
dodat algoritam rangiranja u prezentaciji
</commit_message>
<xml_diff>
--- a/ProjekatPrezentacija.pptx
+++ b/ProjekatPrezentacija.pptx
@@ -16,6 +16,7 @@
     <p:sldId id="263" r:id="rId11"/>
     <p:sldId id="264" r:id="rId12"/>
     <p:sldId id="265" r:id="rId13"/>
+    <p:sldId id="266" r:id="rId14"/>
   </p:sldIdLst>
   <p:sldSz cx="10080625" cy="7559675"/>
   <p:notesSz cx="7559675" cy="10691812"/>
@@ -3298,7 +3299,7 @@
           </a:bodyPr>
           <a:p>
             <a:pPr algn="r"/>
-            <a:fld id="{E58C5A03-6300-40B4-8F5F-E27E0EBC2118}" type="slidenum">
+            <a:fld id="{F6791587-3AE2-4676-A317-A4AF51EBD159}" type="slidenum">
               <a:rPr b="0" lang="en-US" sz="1400" spc="-1" strike="noStrike">
                 <a:latin typeface="Times New Roman"/>
               </a:rPr>
@@ -3781,7 +3782,7 @@
           </a:bodyPr>
           <a:p>
             <a:pPr algn="r"/>
-            <a:fld id="{45484FF7-1E5B-4977-8CCC-7EC5BF924A94}" type="slidenum">
+            <a:fld id="{13C46340-0C7F-42D4-BDF3-F3A032BC8F79}" type="slidenum">
               <a:rPr b="0" lang="en-US" sz="1400" spc="-1" strike="noStrike">
                 <a:latin typeface="Times New Roman"/>
               </a:rPr>
@@ -3928,6 +3929,15 @@
           </a:bodyPr>
           <a:p>
             <a:pPr algn="ctr"/>
+            <a:r>
+              <a:rPr b="0" lang="en-US" sz="4400" spc="-1" strike="noStrike">
+                <a:solidFill>
+                  <a:srgbClr val="ffffff"/>
+                </a:solidFill>
+                <a:latin typeface="Arial"/>
+              </a:rPr>
+              <a:t>Napredna pretraga</a:t>
+            </a:r>
             <a:endParaRPr b="0" lang="en-US" sz="4400" spc="-1" strike="noStrike">
               <a:solidFill>
                 <a:srgbClr val="ffffff"/>
@@ -3940,6 +3950,235 @@
       <p:sp>
         <p:nvSpPr>
           <p:cNvPr id="105" name="TextShape 2"/>
+          <p:cNvSpPr txBox="1"/>
+          <p:nvPr/>
+        </p:nvSpPr>
+        <p:spPr>
+          <a:xfrm>
+            <a:off x="504000" y="1769040"/>
+            <a:ext cx="9071640" cy="4384440"/>
+          </a:xfrm>
+          <a:prstGeom prst="rect">
+            <a:avLst/>
+          </a:prstGeom>
+          <a:noFill/>
+          <a:ln>
+            <a:noFill/>
+          </a:ln>
+        </p:spPr>
+        <p:txBody>
+          <a:bodyPr lIns="0" rIns="0" tIns="0" bIns="0">
+            <a:noAutofit/>
+          </a:bodyPr>
+          <a:p>
+            <a:pPr marL="432000" indent="-324000">
+              <a:spcBef>
+                <a:spcPts val="1417"/>
+              </a:spcBef>
+              <a:buClr>
+                <a:srgbClr val="000000"/>
+              </a:buClr>
+              <a:buSzPct val="45000"/>
+              <a:buFont typeface="Wingdings" charset="2"/>
+              <a:buChar char=""/>
+            </a:pPr>
+            <a:r>
+              <a:rPr b="0" lang="en-US" sz="3200" spc="-1" strike="noStrike">
+                <a:solidFill>
+                  <a:srgbClr val="0066cc"/>
+                </a:solidFill>
+                <a:latin typeface="Arial"/>
+              </a:rPr>
+              <a:t>Upiti koji zadovoljavaju:</a:t>
+            </a:r>
+            <a:endParaRPr b="0" lang="en-US" sz="3200" spc="-1" strike="noStrike">
+              <a:solidFill>
+                <a:srgbClr val="0066cc"/>
+              </a:solidFill>
+              <a:latin typeface="Arial"/>
+            </a:endParaRPr>
+          </a:p>
+          <a:p>
+            <a:pPr lvl="1" marL="864000" indent="-324000">
+              <a:spcBef>
+                <a:spcPts val="1134"/>
+              </a:spcBef>
+              <a:buClr>
+                <a:srgbClr val="000000"/>
+              </a:buClr>
+              <a:buSzPct val="75000"/>
+              <a:buFont typeface="Symbol" charset="2"/>
+              <a:buChar char=""/>
+            </a:pPr>
+            <a:r>
+              <a:rPr b="0" lang="en-US" sz="2800" spc="-1" strike="noStrike">
+                <a:solidFill>
+                  <a:srgbClr val="0066cc"/>
+                </a:solidFill>
+                <a:latin typeface="Arial"/>
+              </a:rPr>
+              <a:t>!(python&amp;&amp;java)  --- dozvoljeni su I razmaci</a:t>
+            </a:r>
+            <a:endParaRPr b="0" lang="en-US" sz="2800" spc="-1" strike="noStrike">
+              <a:solidFill>
+                <a:srgbClr val="0066cc"/>
+              </a:solidFill>
+              <a:latin typeface="Arial"/>
+            </a:endParaRPr>
+          </a:p>
+          <a:p>
+            <a:pPr lvl="1" marL="864000" indent="-324000">
+              <a:spcBef>
+                <a:spcPts val="1134"/>
+              </a:spcBef>
+              <a:buClr>
+                <a:srgbClr val="000000"/>
+              </a:buClr>
+              <a:buSzPct val="75000"/>
+              <a:buFont typeface="Symbol" charset="2"/>
+              <a:buChar char=""/>
+            </a:pPr>
+            <a:r>
+              <a:rPr b="0" lang="en-US" sz="2800" spc="-1" strike="noStrike">
+                <a:solidFill>
+                  <a:srgbClr val="0066cc"/>
+                </a:solidFill>
+                <a:latin typeface="Arial"/>
+              </a:rPr>
+              <a:t>python || java</a:t>
+            </a:r>
+            <a:endParaRPr b="0" lang="en-US" sz="2800" spc="-1" strike="noStrike">
+              <a:solidFill>
+                <a:srgbClr val="0066cc"/>
+              </a:solidFill>
+              <a:latin typeface="Arial"/>
+            </a:endParaRPr>
+          </a:p>
+          <a:p>
+            <a:pPr lvl="1" marL="864000" indent="-324000">
+              <a:spcBef>
+                <a:spcPts val="1134"/>
+              </a:spcBef>
+              <a:buClr>
+                <a:srgbClr val="000000"/>
+              </a:buClr>
+              <a:buSzPct val="75000"/>
+              <a:buFont typeface="Symbol" charset="2"/>
+              <a:buChar char=""/>
+            </a:pPr>
+            <a:r>
+              <a:rPr b="0" lang="en-US" sz="2800" spc="-1" strike="noStrike">
+                <a:solidFill>
+                  <a:srgbClr val="0066cc"/>
+                </a:solidFill>
+                <a:latin typeface="Arial"/>
+              </a:rPr>
+              <a:t>python &amp;&amp; java || ! (programming || language) &amp;&amp; C</a:t>
+            </a:r>
+            <a:endParaRPr b="0" lang="en-US" sz="2800" spc="-1" strike="noStrike">
+              <a:solidFill>
+                <a:srgbClr val="0066cc"/>
+              </a:solidFill>
+              <a:latin typeface="Arial"/>
+            </a:endParaRPr>
+          </a:p>
+          <a:p>
+            <a:pPr lvl="1" marL="864000" indent="-324000">
+              <a:spcBef>
+                <a:spcPts val="1134"/>
+              </a:spcBef>
+              <a:buClr>
+                <a:srgbClr val="000000"/>
+              </a:buClr>
+              <a:buSzPct val="75000"/>
+              <a:buFont typeface="Symbol" charset="2"/>
+              <a:buChar char=""/>
+            </a:pPr>
+            <a:r>
+              <a:rPr b="0" lang="en-US" sz="2800" spc="-1" strike="noStrike">
+                <a:solidFill>
+                  <a:srgbClr val="0066cc"/>
+                </a:solidFill>
+                <a:latin typeface="Arial"/>
+              </a:rPr>
+              <a:t>...</a:t>
+            </a:r>
+            <a:endParaRPr b="0" lang="en-US" sz="2800" spc="-1" strike="noStrike">
+              <a:solidFill>
+                <a:srgbClr val="0066cc"/>
+              </a:solidFill>
+              <a:latin typeface="Arial"/>
+            </a:endParaRPr>
+          </a:p>
+        </p:txBody>
+      </p:sp>
+    </p:spTree>
+  </p:cSld>
+  <mc:AlternateContent>
+    <mc:Choice Requires="p14">
+      <p:transition spd="slow" p14:dur="2000"/>
+    </mc:Choice>
+    <mc:Fallback>
+      <p:transition spd="slow"/>
+    </mc:Fallback>
+  </mc:AlternateContent>
+</p:sld>
+</file>
+
+<file path=ppt/slides/slide11.xml><?xml version="1.0" encoding="utf-8"?>
+<p:sld xmlns:a="http://schemas.openxmlformats.org/drawingml/2006/main" xmlns:p="http://schemas.openxmlformats.org/presentationml/2006/main" xmlns:r="http://schemas.openxmlformats.org/officeDocument/2006/relationships" xmlns:p14="http://schemas.microsoft.com/office/powerpoint/2010/main" xmlns:p15="http://schemas.microsoft.com/office/powerpoint/2012/main" xmlns:mc="http://schemas.openxmlformats.org/markup-compatibility/2006">
+  <p:cSld>
+    <p:spTree>
+      <p:nvGrpSpPr>
+        <p:cNvPr id="1" name=""/>
+        <p:cNvGrpSpPr/>
+        <p:nvPr/>
+      </p:nvGrpSpPr>
+      <p:grpSpPr>
+        <a:xfrm>
+          <a:off x="0" y="0"/>
+          <a:ext cx="0" cy="0"/>
+          <a:chOff x="0" y="0"/>
+          <a:chExt cx="0" cy="0"/>
+        </a:xfrm>
+      </p:grpSpPr>
+      <p:sp>
+        <p:nvSpPr>
+          <p:cNvPr id="106" name="TextShape 1"/>
+          <p:cNvSpPr txBox="1"/>
+          <p:nvPr/>
+        </p:nvSpPr>
+        <p:spPr>
+          <a:xfrm>
+            <a:off x="504000" y="301320"/>
+            <a:ext cx="9071640" cy="637560"/>
+          </a:xfrm>
+          <a:prstGeom prst="rect">
+            <a:avLst/>
+          </a:prstGeom>
+          <a:noFill/>
+          <a:ln>
+            <a:noFill/>
+          </a:ln>
+        </p:spPr>
+        <p:txBody>
+          <a:bodyPr lIns="0" rIns="0" tIns="0" bIns="0" anchor="ctr">
+            <a:spAutoFit/>
+          </a:bodyPr>
+          <a:p>
+            <a:pPr algn="ctr"/>
+            <a:endParaRPr b="0" lang="en-US" sz="4400" spc="-1" strike="noStrike">
+              <a:solidFill>
+                <a:srgbClr val="ffffff"/>
+              </a:solidFill>
+              <a:latin typeface="Arial"/>
+            </a:endParaRPr>
+          </a:p>
+        </p:txBody>
+      </p:sp>
+      <p:sp>
+        <p:nvSpPr>
+          <p:cNvPr id="107" name="TextShape 2"/>
           <p:cNvSpPr txBox="1"/>
           <p:nvPr/>
         </p:nvSpPr>
@@ -4930,7 +5169,7 @@
                 </a:solidFill>
                 <a:latin typeface="Arial"/>
               </a:rPr>
-              <a:t>Pretraga</a:t>
+              <a:t>Algoritam za rangiranje stranica</a:t>
             </a:r>
             <a:endParaRPr b="0" lang="en-US" sz="4400" spc="-1" strike="noStrike">
               <a:solidFill>
@@ -4949,8 +5188,8 @@
         </p:nvSpPr>
         <p:spPr>
           <a:xfrm>
-            <a:off x="504000" y="1769040"/>
-            <a:ext cx="9071640" cy="4384440"/>
+            <a:off x="548640" y="1026720"/>
+            <a:ext cx="8412480" cy="5922720"/>
           </a:xfrm>
           <a:prstGeom prst="rect">
             <a:avLst/>
@@ -4961,594 +5200,228 @@
           </a:ln>
         </p:spPr>
         <p:txBody>
-          <a:bodyPr lIns="0" rIns="0" tIns="0" bIns="0">
-            <a:noAutofit/>
-          </a:bodyPr>
-          <a:p>
-            <a:pPr marL="432000" indent="-324000">
-              <a:spcBef>
-                <a:spcPts val="1417"/>
-              </a:spcBef>
-              <a:buClr>
-                <a:srgbClr val="000000"/>
-              </a:buClr>
-              <a:buSzPct val="45000"/>
-              <a:buFont typeface="Wingdings" charset="2"/>
-              <a:buChar char=""/>
-            </a:pPr>
-            <a:r>
-              <a:rPr b="0" lang="en-US" sz="3200" spc="-1" strike="noStrike">
-                <a:solidFill>
-                  <a:srgbClr val="0066cc"/>
-                </a:solidFill>
-                <a:latin typeface="Arial"/>
-              </a:rPr>
-              <a:t>Dve opcije pretrage:</a:t>
-            </a:r>
-            <a:endParaRPr b="0" lang="en-US" sz="3200" spc="-1" strike="noStrike">
-              <a:solidFill>
-                <a:srgbClr val="0066cc"/>
-              </a:solidFill>
-              <a:latin typeface="Arial"/>
-            </a:endParaRPr>
-          </a:p>
-          <a:p>
-            <a:pPr marL="432000" indent="-324000">
-              <a:spcBef>
-                <a:spcPts val="1417"/>
-              </a:spcBef>
-              <a:buClr>
-                <a:srgbClr val="000000"/>
-              </a:buClr>
-              <a:buSzPct val="45000"/>
-              <a:buFont typeface="Wingdings" charset="2"/>
-              <a:buChar char=""/>
-            </a:pPr>
-            <a:r>
-              <a:rPr b="0" lang="en-US" sz="3200" spc="-1" strike="noStrike">
-                <a:solidFill>
-                  <a:srgbClr val="0066cc"/>
-                </a:solidFill>
-                <a:latin typeface="Arial"/>
-              </a:rPr>
-              <a:t>Obicna pretraga</a:t>
-            </a:r>
-            <a:endParaRPr b="0" lang="en-US" sz="3200" spc="-1" strike="noStrike">
-              <a:solidFill>
-                <a:srgbClr val="0066cc"/>
-              </a:solidFill>
-              <a:latin typeface="Arial"/>
-            </a:endParaRPr>
-          </a:p>
-          <a:p>
-            <a:pPr marL="432000" indent="-324000">
-              <a:spcBef>
-                <a:spcPts val="1417"/>
-              </a:spcBef>
-              <a:buClr>
-                <a:srgbClr val="000000"/>
-              </a:buClr>
-              <a:buSzPct val="45000"/>
-              <a:buFont typeface="Wingdings" charset="2"/>
-              <a:buChar char=""/>
-            </a:pPr>
-            <a:r>
-              <a:rPr b="0" lang="en-US" sz="3200" spc="-1" strike="noStrike">
-                <a:solidFill>
-                  <a:srgbClr val="0066cc"/>
-                </a:solidFill>
-                <a:latin typeface="Arial"/>
-              </a:rPr>
-              <a:t>Napredna pretraga</a:t>
-            </a:r>
-            <a:endParaRPr b="0" lang="en-US" sz="3200" spc="-1" strike="noStrike">
-              <a:solidFill>
-                <a:srgbClr val="0066cc"/>
-              </a:solidFill>
-              <a:latin typeface="Arial"/>
-            </a:endParaRPr>
-          </a:p>
-        </p:txBody>
-      </p:sp>
-    </p:spTree>
-  </p:cSld>
-  <mc:AlternateContent>
-    <mc:Choice Requires="p14">
-      <p:transition spd="slow" p14:dur="2000"/>
-    </mc:Choice>
-    <mc:Fallback>
-      <p:transition spd="slow"/>
-    </mc:Fallback>
-  </mc:AlternateContent>
-</p:sld>
-</file>
-
-<file path=ppt/slides/slide7.xml><?xml version="1.0" encoding="utf-8"?>
-<p:sld xmlns:a="http://schemas.openxmlformats.org/drawingml/2006/main" xmlns:p="http://schemas.openxmlformats.org/presentationml/2006/main" xmlns:r="http://schemas.openxmlformats.org/officeDocument/2006/relationships" xmlns:p14="http://schemas.microsoft.com/office/powerpoint/2010/main" xmlns:p15="http://schemas.microsoft.com/office/powerpoint/2012/main" xmlns:mc="http://schemas.openxmlformats.org/markup-compatibility/2006">
-  <p:cSld>
-    <p:spTree>
-      <p:nvGrpSpPr>
-        <p:cNvPr id="1" name=""/>
-        <p:cNvGrpSpPr/>
-        <p:nvPr/>
-      </p:nvGrpSpPr>
-      <p:grpSpPr>
-        <a:xfrm>
-          <a:off x="0" y="0"/>
-          <a:ext cx="0" cy="0"/>
-          <a:chOff x="0" y="0"/>
-          <a:chExt cx="0" cy="0"/>
-        </a:xfrm>
-      </p:grpSpPr>
-      <p:sp>
-        <p:nvSpPr>
-          <p:cNvPr id="98" name="TextShape 1"/>
-          <p:cNvSpPr txBox="1"/>
-          <p:nvPr/>
-        </p:nvSpPr>
-        <p:spPr>
-          <a:xfrm>
-            <a:off x="504000" y="301320"/>
-            <a:ext cx="9071640" cy="637560"/>
-          </a:xfrm>
-          <a:prstGeom prst="rect">
-            <a:avLst/>
-          </a:prstGeom>
-          <a:noFill/>
-          <a:ln>
-            <a:noFill/>
-          </a:ln>
-        </p:spPr>
-        <p:txBody>
-          <a:bodyPr lIns="0" rIns="0" tIns="0" bIns="0" anchor="ctr">
+          <a:bodyPr lIns="90000" rIns="90000" tIns="45000" bIns="45000">
             <a:spAutoFit/>
           </a:bodyPr>
           <a:p>
-            <a:pPr algn="ctr"/>
-            <a:r>
-              <a:rPr b="0" lang="en-US" sz="4400" spc="-1" strike="noStrike">
-                <a:solidFill>
-                  <a:srgbClr val="ffffff"/>
-                </a:solidFill>
-                <a:latin typeface="Arial"/>
-              </a:rPr>
-              <a:t>Obicna pretraga</a:t>
-            </a:r>
-            <a:endParaRPr b="0" lang="en-US" sz="4400" spc="-1" strike="noStrike">
-              <a:solidFill>
-                <a:srgbClr val="ffffff"/>
-              </a:solidFill>
-              <a:latin typeface="Arial"/>
-            </a:endParaRPr>
-          </a:p>
-        </p:txBody>
-      </p:sp>
-      <p:sp>
-        <p:nvSpPr>
-          <p:cNvPr id="99" name="TextShape 2"/>
-          <p:cNvSpPr txBox="1"/>
-          <p:nvPr/>
-        </p:nvSpPr>
-        <p:spPr>
-          <a:xfrm>
-            <a:off x="504000" y="1769040"/>
-            <a:ext cx="9071640" cy="4384440"/>
-          </a:xfrm>
-          <a:prstGeom prst="rect">
-            <a:avLst/>
-          </a:prstGeom>
-          <a:noFill/>
-          <a:ln>
-            <a:noFill/>
-          </a:ln>
-        </p:spPr>
-        <p:txBody>
-          <a:bodyPr lIns="0" rIns="0" tIns="0" bIns="0">
-            <a:noAutofit/>
-          </a:bodyPr>
-          <a:p>
-            <a:pPr marL="432000" indent="-324000">
-              <a:spcBef>
-                <a:spcPts val="1417"/>
-              </a:spcBef>
-              <a:buClr>
-                <a:srgbClr val="000000"/>
-              </a:buClr>
-              <a:buSzPct val="45000"/>
-              <a:buFont typeface="Wingdings" charset="2"/>
-              <a:buChar char=""/>
-            </a:pPr>
-            <a:r>
-              <a:rPr b="0" lang="en-US" sz="3200" spc="-1" strike="noStrike">
-                <a:solidFill>
-                  <a:srgbClr val="0066cc"/>
-                </a:solidFill>
-                <a:latin typeface="Arial"/>
-              </a:rPr>
-              <a:t>Dozvoljeni upiti:</a:t>
-            </a:r>
-            <a:endParaRPr b="0" lang="en-US" sz="3200" spc="-1" strike="noStrike">
-              <a:solidFill>
-                <a:srgbClr val="0066cc"/>
-              </a:solidFill>
-              <a:latin typeface="Arial"/>
-            </a:endParaRPr>
-          </a:p>
-          <a:p>
-            <a:pPr lvl="1" marL="864000" indent="-324000">
-              <a:spcBef>
-                <a:spcPts val="1134"/>
-              </a:spcBef>
-              <a:buClr>
-                <a:srgbClr val="000000"/>
-              </a:buClr>
-              <a:buSzPct val="75000"/>
-              <a:buFont typeface="Symbol" charset="2"/>
-              <a:buChar char=""/>
-            </a:pPr>
-            <a:r>
-              <a:rPr b="0" lang="en-US" sz="2800" spc="-1" strike="noStrike">
-                <a:solidFill>
-                  <a:srgbClr val="0066cc"/>
-                </a:solidFill>
-                <a:latin typeface="Arial"/>
-              </a:rPr>
-              <a:t>python and java</a:t>
-            </a:r>
-            <a:endParaRPr b="0" lang="en-US" sz="2800" spc="-1" strike="noStrike">
-              <a:solidFill>
-                <a:srgbClr val="0066cc"/>
-              </a:solidFill>
-              <a:latin typeface="Arial"/>
-            </a:endParaRPr>
-          </a:p>
-          <a:p>
-            <a:pPr lvl="1" marL="864000" indent="-324000">
-              <a:spcBef>
-                <a:spcPts val="1134"/>
-              </a:spcBef>
-              <a:buClr>
-                <a:srgbClr val="000000"/>
-              </a:buClr>
-              <a:buSzPct val="75000"/>
-              <a:buFont typeface="Symbol" charset="2"/>
-              <a:buChar char=""/>
-            </a:pPr>
-            <a:r>
-              <a:rPr b="0" lang="en-US" sz="2800" spc="-1" strike="noStrike">
-                <a:solidFill>
-                  <a:srgbClr val="0066cc"/>
-                </a:solidFill>
-                <a:latin typeface="Arial"/>
-              </a:rPr>
-              <a:t>python or java</a:t>
-            </a:r>
-            <a:endParaRPr b="0" lang="en-US" sz="2800" spc="-1" strike="noStrike">
-              <a:solidFill>
-                <a:srgbClr val="0066cc"/>
-              </a:solidFill>
-              <a:latin typeface="Arial"/>
-            </a:endParaRPr>
-          </a:p>
-          <a:p>
-            <a:pPr lvl="1" marL="864000" indent="-324000">
-              <a:spcBef>
-                <a:spcPts val="1134"/>
-              </a:spcBef>
-              <a:buClr>
-                <a:srgbClr val="000000"/>
-              </a:buClr>
-              <a:buSzPct val="75000"/>
-              <a:buFont typeface="Symbol" charset="2"/>
-              <a:buChar char=""/>
-            </a:pPr>
-            <a:r>
-              <a:rPr b="0" lang="en-US" sz="2800" spc="-1" strike="noStrike">
-                <a:solidFill>
-                  <a:srgbClr val="0066cc"/>
-                </a:solidFill>
-                <a:latin typeface="Arial"/>
-              </a:rPr>
-              <a:t>python not java</a:t>
-            </a:r>
-            <a:endParaRPr b="0" lang="en-US" sz="2800" spc="-1" strike="noStrike">
-              <a:solidFill>
-                <a:srgbClr val="0066cc"/>
-              </a:solidFill>
-              <a:latin typeface="Arial"/>
-            </a:endParaRPr>
-          </a:p>
-          <a:p>
-            <a:pPr lvl="1" marL="864000" indent="-324000">
-              <a:spcBef>
-                <a:spcPts val="1134"/>
-              </a:spcBef>
-              <a:buClr>
-                <a:srgbClr val="000000"/>
-              </a:buClr>
-              <a:buSzPct val="75000"/>
-              <a:buFont typeface="Symbol" charset="2"/>
-              <a:buChar char=""/>
-            </a:pPr>
-            <a:r>
-              <a:rPr b="0" lang="en-US" sz="2800" spc="-1" strike="noStrike">
-                <a:solidFill>
-                  <a:srgbClr val="0066cc"/>
-                </a:solidFill>
-                <a:latin typeface="Arial"/>
-              </a:rPr>
-              <a:t>not python</a:t>
-            </a:r>
-            <a:endParaRPr b="0" lang="en-US" sz="2800" spc="-1" strike="noStrike">
-              <a:solidFill>
-                <a:srgbClr val="0066cc"/>
-              </a:solidFill>
-              <a:latin typeface="Arial"/>
-            </a:endParaRPr>
-          </a:p>
-          <a:p>
-            <a:pPr lvl="1" marL="864000" indent="-324000">
-              <a:spcBef>
-                <a:spcPts val="1134"/>
-              </a:spcBef>
-              <a:buClr>
-                <a:srgbClr val="000000"/>
-              </a:buClr>
-              <a:buSzPct val="75000"/>
-              <a:buFont typeface="Symbol" charset="2"/>
-              <a:buChar char=""/>
-            </a:pPr>
-            <a:r>
-              <a:rPr b="0" lang="en-US" sz="2800" spc="-1" strike="noStrike">
-                <a:solidFill>
-                  <a:srgbClr val="0066cc"/>
-                </a:solidFill>
-                <a:latin typeface="Arial"/>
-              </a:rPr>
-              <a:t>python programming language etc. </a:t>
-            </a:r>
-            <a:endParaRPr b="0" lang="en-US" sz="2800" spc="-1" strike="noStrike">
-              <a:solidFill>
-                <a:srgbClr val="0066cc"/>
-              </a:solidFill>
-              <a:latin typeface="Arial"/>
-            </a:endParaRPr>
-          </a:p>
-        </p:txBody>
-      </p:sp>
-    </p:spTree>
-  </p:cSld>
-  <mc:AlternateContent>
-    <mc:Choice Requires="p14">
-      <p:transition spd="slow" p14:dur="2000"/>
-    </mc:Choice>
-    <mc:Fallback>
-      <p:transition spd="slow"/>
-    </mc:Fallback>
-  </mc:AlternateContent>
-</p:sld>
-</file>
-
-<file path=ppt/slides/slide8.xml><?xml version="1.0" encoding="utf-8"?>
-<p:sld xmlns:a="http://schemas.openxmlformats.org/drawingml/2006/main" xmlns:p="http://schemas.openxmlformats.org/presentationml/2006/main" xmlns:r="http://schemas.openxmlformats.org/officeDocument/2006/relationships" xmlns:p14="http://schemas.microsoft.com/office/powerpoint/2010/main" xmlns:p15="http://schemas.microsoft.com/office/powerpoint/2012/main" xmlns:mc="http://schemas.openxmlformats.org/markup-compatibility/2006">
-  <p:cSld>
-    <p:spTree>
-      <p:nvGrpSpPr>
-        <p:cNvPr id="1" name=""/>
-        <p:cNvGrpSpPr/>
-        <p:nvPr/>
-      </p:nvGrpSpPr>
-      <p:grpSpPr>
-        <a:xfrm>
-          <a:off x="0" y="0"/>
-          <a:ext cx="0" cy="0"/>
-          <a:chOff x="0" y="0"/>
-          <a:chExt cx="0" cy="0"/>
-        </a:xfrm>
-      </p:grpSpPr>
-      <p:sp>
-        <p:nvSpPr>
-          <p:cNvPr id="100" name="TextShape 1"/>
-          <p:cNvSpPr txBox="1"/>
-          <p:nvPr/>
-        </p:nvSpPr>
-        <p:spPr>
-          <a:xfrm>
-            <a:off x="504000" y="301320"/>
-            <a:ext cx="9071640" cy="637560"/>
-          </a:xfrm>
-          <a:prstGeom prst="rect">
-            <a:avLst/>
-          </a:prstGeom>
-          <a:noFill/>
-          <a:ln>
-            <a:noFill/>
-          </a:ln>
-        </p:spPr>
-        <p:txBody>
-          <a:bodyPr lIns="0" rIns="0" tIns="0" bIns="0" anchor="ctr">
-            <a:spAutoFit/>
-          </a:bodyPr>
-          <a:p>
-            <a:pPr algn="ctr"/>
-            <a:r>
-              <a:rPr b="0" lang="en-US" sz="4400" spc="-1" strike="noStrike">
-                <a:solidFill>
-                  <a:srgbClr val="ffffff"/>
-                </a:solidFill>
-                <a:latin typeface="Arial"/>
-              </a:rPr>
-              <a:t>Obicna pretraga</a:t>
-            </a:r>
-            <a:endParaRPr b="0" lang="en-US" sz="4400" spc="-1" strike="noStrike">
-              <a:solidFill>
-                <a:srgbClr val="ffffff"/>
-              </a:solidFill>
-              <a:latin typeface="Arial"/>
-            </a:endParaRPr>
-          </a:p>
-        </p:txBody>
-      </p:sp>
-      <p:sp>
-        <p:nvSpPr>
-          <p:cNvPr id="101" name="TextShape 2"/>
-          <p:cNvSpPr txBox="1"/>
-          <p:nvPr/>
-        </p:nvSpPr>
-        <p:spPr>
-          <a:xfrm>
-            <a:off x="504000" y="1769040"/>
-            <a:ext cx="9071640" cy="4384440"/>
-          </a:xfrm>
-          <a:prstGeom prst="rect">
-            <a:avLst/>
-          </a:prstGeom>
-          <a:noFill/>
-          <a:ln>
-            <a:noFill/>
-          </a:ln>
-        </p:spPr>
-        <p:txBody>
-          <a:bodyPr lIns="0" rIns="0" tIns="0" bIns="0">
-            <a:noAutofit/>
-          </a:bodyPr>
-          <a:p>
-            <a:pPr marL="432000" indent="-324000">
-              <a:spcBef>
-                <a:spcPts val="1417"/>
-              </a:spcBef>
-              <a:buClr>
-                <a:srgbClr val="000000"/>
-              </a:buClr>
-              <a:buSzPct val="45000"/>
-              <a:buFont typeface="Wingdings" charset="2"/>
-              <a:buChar char=""/>
-            </a:pPr>
-            <a:r>
-              <a:rPr b="0" lang="en-US" sz="3200" spc="-1" strike="noStrike">
-                <a:solidFill>
-                  <a:srgbClr val="0066cc"/>
-                </a:solidFill>
-                <a:latin typeface="Arial"/>
-              </a:rPr>
-              <a:t>Set:</a:t>
-            </a:r>
-            <a:endParaRPr b="0" lang="en-US" sz="3200" spc="-1" strike="noStrike">
-              <a:solidFill>
-                <a:srgbClr val="0066cc"/>
-              </a:solidFill>
-              <a:latin typeface="Arial"/>
-            </a:endParaRPr>
-          </a:p>
-          <a:p>
-            <a:pPr lvl="1" marL="864000" indent="-324000">
-              <a:spcBef>
-                <a:spcPts val="1134"/>
-              </a:spcBef>
-              <a:buClr>
-                <a:srgbClr val="000000"/>
-              </a:buClr>
-              <a:buSzPct val="75000"/>
-              <a:buFont typeface="Symbol" charset="2"/>
-              <a:buChar char=""/>
-            </a:pPr>
-            <a:r>
-              <a:rPr b="0" lang="en-US" sz="2800" spc="-1" strike="noStrike">
-                <a:solidFill>
-                  <a:srgbClr val="0066cc"/>
-                </a:solidFill>
-                <a:latin typeface="Arial"/>
-              </a:rPr>
-              <a:t>Pomocna struktura podataka koja sadrzi listu stranica koje zadovoljavaju trazeni upit.</a:t>
-            </a:r>
-            <a:endParaRPr b="0" lang="en-US" sz="2800" spc="-1" strike="noStrike">
-              <a:solidFill>
-                <a:srgbClr val="0066cc"/>
-              </a:solidFill>
-              <a:latin typeface="Arial"/>
-            </a:endParaRPr>
-          </a:p>
-          <a:p>
-            <a:pPr lvl="1" marL="864000" indent="-324000">
-              <a:spcBef>
-                <a:spcPts val="1134"/>
-              </a:spcBef>
-              <a:buClr>
-                <a:srgbClr val="000000"/>
-              </a:buClr>
-              <a:buSzPct val="75000"/>
-              <a:buFont typeface="Symbol" charset="2"/>
-              <a:buChar char=""/>
-            </a:pPr>
-            <a:r>
-              <a:rPr b="0" lang="en-US" sz="2800" spc="-1" strike="noStrike">
-                <a:solidFill>
-                  <a:srgbClr val="0066cc"/>
-                </a:solidFill>
-                <a:latin typeface="Arial"/>
-              </a:rPr>
-              <a:t>Za svaku rec upita odvaja se skup sa stranicama koje sadrze datu rec.</a:t>
-            </a:r>
-            <a:endParaRPr b="0" lang="en-US" sz="2800" spc="-1" strike="noStrike">
-              <a:solidFill>
-                <a:srgbClr val="0066cc"/>
-              </a:solidFill>
-              <a:latin typeface="Arial"/>
-            </a:endParaRPr>
-          </a:p>
-          <a:p>
-            <a:pPr lvl="1" marL="864000" indent="-324000">
-              <a:spcBef>
-                <a:spcPts val="1134"/>
-              </a:spcBef>
-              <a:buClr>
-                <a:srgbClr val="000000"/>
-              </a:buClr>
-              <a:buSzPct val="75000"/>
-              <a:buFont typeface="Symbol" charset="2"/>
-              <a:buChar char=""/>
-            </a:pPr>
-            <a:r>
-              <a:rPr b="0" lang="en-US" sz="2800" spc="-1" strike="noStrike">
-                <a:solidFill>
-                  <a:srgbClr val="0066cc"/>
-                </a:solidFill>
-                <a:latin typeface="Arial"/>
-              </a:rPr>
-              <a:t>U setu se takodje nalaze osnovne skupovne operacije (unija, presek, razlika, komplement)</a:t>
-            </a:r>
-            <a:endParaRPr b="0" lang="en-US" sz="2800" spc="-1" strike="noStrike">
-              <a:solidFill>
-                <a:srgbClr val="0066cc"/>
-              </a:solidFill>
-              <a:latin typeface="Arial"/>
-            </a:endParaRPr>
-          </a:p>
-          <a:p>
-            <a:pPr lvl="1" marL="864000" indent="-324000">
-              <a:spcBef>
-                <a:spcPts val="1134"/>
-              </a:spcBef>
-              <a:buClr>
-                <a:srgbClr val="000000"/>
-              </a:buClr>
-              <a:buSzPct val="75000"/>
-              <a:buFont typeface="Symbol" charset="2"/>
-              <a:buChar char=""/>
-            </a:pPr>
-            <a:r>
-              <a:rPr b="0" lang="en-US" sz="2800" spc="-1" strike="noStrike">
-                <a:solidFill>
-                  <a:srgbClr val="0066cc"/>
-                </a:solidFill>
-                <a:latin typeface="Arial"/>
-              </a:rPr>
-              <a:t>Rezultujuci set je set koji se vraca pozivom neke od osnovnih skupovnih operacija</a:t>
-            </a:r>
-            <a:endParaRPr b="0" lang="en-US" sz="2800" spc="-1" strike="noStrike">
-              <a:solidFill>
-                <a:srgbClr val="0066cc"/>
-              </a:solidFill>
+            <a:r>
+              <a:rPr b="0" lang="en-US" sz="1800" spc="-1" strike="noStrike">
+                <a:latin typeface="Arial"/>
+              </a:rPr>
+              <a:t>For page in result_set:</a:t>
+            </a:r>
+            <a:endParaRPr b="0" lang="en-US" sz="1800" spc="-1" strike="noStrike">
+              <a:latin typeface="Arial"/>
+            </a:endParaRPr>
+          </a:p>
+          <a:p>
+            <a:r>
+              <a:rPr b="0" lang="en-US" sz="1800" spc="-1" strike="noStrike">
+                <a:latin typeface="Arial"/>
+              </a:rPr>
+              <a:t>	</a:t>
+            </a:r>
+            <a:r>
+              <a:rPr b="0" lang="en-US" sz="1800" spc="-1" strike="noStrike">
+                <a:latin typeface="Arial"/>
+              </a:rPr>
+              <a:t>page_rank += result_set.count(word_for_search)</a:t>
+            </a:r>
+            <a:endParaRPr b="0" lang="en-US" sz="1800" spc="-1" strike="noStrike">
+              <a:latin typeface="Arial"/>
+            </a:endParaRPr>
+          </a:p>
+          <a:p>
+            <a:endParaRPr b="0" lang="en-US" sz="1800" spc="-1" strike="noStrike">
+              <a:latin typeface="Arial"/>
+            </a:endParaRPr>
+          </a:p>
+          <a:p>
+            <a:r>
+              <a:rPr b="0" lang="en-US" sz="1800" spc="-1" strike="noStrike">
+                <a:latin typeface="Arial"/>
+              </a:rPr>
+              <a:t>For page in result_set:</a:t>
+            </a:r>
+            <a:endParaRPr b="0" lang="en-US" sz="1800" spc="-1" strike="noStrike">
+              <a:latin typeface="Arial"/>
+            </a:endParaRPr>
+          </a:p>
+          <a:p>
+            <a:r>
+              <a:rPr b="0" lang="en-US" sz="1800" spc="-1" strike="noStrike">
+                <a:latin typeface="Arial"/>
+              </a:rPr>
+              <a:t>	</a:t>
+            </a:r>
+            <a:r>
+              <a:rPr b="0" lang="en-US" sz="1800" spc="-1" strike="noStrike">
+                <a:latin typeface="Arial"/>
+              </a:rPr>
+              <a:t>page_rank = page_rank * 0.5</a:t>
+            </a:r>
+            <a:endParaRPr b="0" lang="en-US" sz="1800" spc="-1" strike="noStrike">
+              <a:latin typeface="Arial"/>
+            </a:endParaRPr>
+          </a:p>
+          <a:p>
+            <a:endParaRPr b="0" lang="en-US" sz="1800" spc="-1" strike="noStrike">
+              <a:latin typeface="Arial"/>
+            </a:endParaRPr>
+          </a:p>
+          <a:p>
+            <a:r>
+              <a:rPr b="0" lang="en-US" sz="1800" spc="-1" strike="noStrike">
+                <a:latin typeface="Arial"/>
+              </a:rPr>
+              <a:t>– </a:t>
+            </a:r>
+            <a:r>
+              <a:rPr b="0" lang="en-US" sz="1800" spc="-1" strike="noStrike">
+                <a:latin typeface="Arial"/>
+              </a:rPr>
+              <a:t>&gt; rang stranice u startu jednak broju pojavljivanja reci u stranici pomnozen sa 0.5</a:t>
+            </a:r>
+            <a:endParaRPr b="0" lang="en-US" sz="1800" spc="-1" strike="noStrike">
+              <a:latin typeface="Arial"/>
+            </a:endParaRPr>
+          </a:p>
+          <a:p>
+            <a:endParaRPr b="0" lang="en-US" sz="1800" spc="-1" strike="noStrike">
+              <a:latin typeface="Arial"/>
+            </a:endParaRPr>
+          </a:p>
+          <a:p>
+            <a:r>
+              <a:rPr b="0" lang="en-US" sz="1800" spc="-1" strike="noStrike">
+                <a:latin typeface="Arial"/>
+              </a:rPr>
+              <a:t>– </a:t>
+            </a:r>
+            <a:r>
+              <a:rPr b="0" lang="en-US" sz="1800" spc="-1" strike="noStrike">
+                <a:latin typeface="Arial"/>
+              </a:rPr>
+              <a:t>&gt; na rang stranice takodje ce uticati broj reci u stranicama koje pokazuju na njega:</a:t>
+            </a:r>
+            <a:endParaRPr b="0" lang="en-US" sz="1800" spc="-1" strike="noStrike">
+              <a:latin typeface="Arial"/>
+            </a:endParaRPr>
+          </a:p>
+          <a:p>
+            <a:endParaRPr b="0" lang="en-US" sz="1800" spc="-1" strike="noStrike">
+              <a:latin typeface="Arial"/>
+            </a:endParaRPr>
+          </a:p>
+          <a:p>
+            <a:r>
+              <a:rPr b="0" lang="en-US" sz="1800" spc="-1" strike="noStrike">
+                <a:latin typeface="Arial"/>
+              </a:rPr>
+              <a:t> </a:t>
+            </a:r>
+            <a:r>
+              <a:rPr b="0" lang="en-US" sz="1800" spc="-1" strike="noStrike">
+                <a:latin typeface="Arial"/>
+              </a:rPr>
+              <a:t>If word in page.incoming_pages:</a:t>
+            </a:r>
+            <a:endParaRPr b="0" lang="en-US" sz="1800" spc="-1" strike="noStrike">
+              <a:latin typeface="Arial"/>
+            </a:endParaRPr>
+          </a:p>
+          <a:p>
+            <a:r>
+              <a:rPr b="0" lang="en-US" sz="1800" spc="-1" strike="noStrike">
+                <a:latin typeface="Arial"/>
+              </a:rPr>
+              <a:t>	</a:t>
+            </a:r>
+            <a:r>
+              <a:rPr b="0" lang="en-US" sz="1800" spc="-1" strike="noStrike">
+                <a:latin typeface="Arial"/>
+              </a:rPr>
+              <a:t>page_rank += 1</a:t>
+            </a:r>
+            <a:endParaRPr b="0" lang="en-US" sz="1800" spc="-1" strike="noStrike">
+              <a:latin typeface="Arial"/>
+            </a:endParaRPr>
+          </a:p>
+          <a:p>
+            <a:r>
+              <a:rPr b="0" lang="en-US" sz="1800" spc="-1" strike="noStrike">
+                <a:latin typeface="Arial"/>
+              </a:rPr>
+              <a:t>Else:</a:t>
+            </a:r>
+            <a:endParaRPr b="0" lang="en-US" sz="1800" spc="-1" strike="noStrike">
+              <a:latin typeface="Arial"/>
+            </a:endParaRPr>
+          </a:p>
+          <a:p>
+            <a:r>
+              <a:rPr b="0" lang="en-US" sz="1800" spc="-1" strike="noStrike">
+                <a:latin typeface="Arial"/>
+              </a:rPr>
+              <a:t>	</a:t>
+            </a:r>
+            <a:r>
+              <a:rPr b="0" lang="en-US" sz="1800" spc="-1" strike="noStrike">
+                <a:latin typeface="Arial"/>
+              </a:rPr>
+              <a:t>page_rank += 0.5</a:t>
+            </a:r>
+            <a:endParaRPr b="0" lang="en-US" sz="1800" spc="-1" strike="noStrike">
+              <a:latin typeface="Arial"/>
+            </a:endParaRPr>
+          </a:p>
+          <a:p>
+            <a:endParaRPr b="0" lang="en-US" sz="1800" spc="-1" strike="noStrike">
+              <a:latin typeface="Arial"/>
+            </a:endParaRPr>
+          </a:p>
+          <a:p>
+            <a:r>
+              <a:rPr b="0" lang="en-US" sz="1800" spc="-1" strike="noStrike">
+                <a:latin typeface="Arial"/>
+              </a:rPr>
+              <a:t>– </a:t>
+            </a:r>
+            <a:r>
+              <a:rPr b="0" lang="en-US" sz="1800" spc="-1" strike="noStrike">
+                <a:latin typeface="Arial"/>
+              </a:rPr>
+              <a:t>&gt; takodje na rang utice rang stranice koje pokazuju na njega pomnozen sa 0.3:</a:t>
+            </a:r>
+            <a:endParaRPr b="0" lang="en-US" sz="1800" spc="-1" strike="noStrike">
+              <a:latin typeface="Arial"/>
+            </a:endParaRPr>
+          </a:p>
+          <a:p>
+            <a:r>
+              <a:rPr b="0" lang="en-US" sz="1800" spc="-1" strike="noStrike">
+                <a:latin typeface="Arial"/>
+              </a:rPr>
+              <a:t>For pages in page.incoming_pages:</a:t>
+            </a:r>
+            <a:endParaRPr b="0" lang="en-US" sz="1800" spc="-1" strike="noStrike">
+              <a:latin typeface="Arial"/>
+            </a:endParaRPr>
+          </a:p>
+          <a:p>
+            <a:r>
+              <a:rPr b="0" lang="en-US" sz="1800" spc="-1" strike="noStrike">
+                <a:latin typeface="Arial"/>
+              </a:rPr>
+              <a:t>	</a:t>
+            </a:r>
+            <a:r>
+              <a:rPr b="0" lang="en-US" sz="1800" spc="-1" strike="noStrike">
+                <a:latin typeface="Arial"/>
+              </a:rPr>
+              <a:t>page_rank += page.get_rank * 0.3</a:t>
+            </a:r>
+            <a:endParaRPr b="0" lang="en-US" sz="1800" spc="-1" strike="noStrike">
               <a:latin typeface="Arial"/>
             </a:endParaRPr>
           </a:p>
@@ -5594,6 +5467,454 @@
 </p:sld>
 </file>
 
+<file path=ppt/slides/slide7.xml><?xml version="1.0" encoding="utf-8"?>
+<p:sld xmlns:a="http://schemas.openxmlformats.org/drawingml/2006/main" xmlns:p="http://schemas.openxmlformats.org/presentationml/2006/main" xmlns:r="http://schemas.openxmlformats.org/officeDocument/2006/relationships" xmlns:p14="http://schemas.microsoft.com/office/powerpoint/2010/main" xmlns:p15="http://schemas.microsoft.com/office/powerpoint/2012/main" xmlns:mc="http://schemas.openxmlformats.org/markup-compatibility/2006">
+  <p:cSld>
+    <p:spTree>
+      <p:nvGrpSpPr>
+        <p:cNvPr id="1" name=""/>
+        <p:cNvGrpSpPr/>
+        <p:nvPr/>
+      </p:nvGrpSpPr>
+      <p:grpSpPr>
+        <a:xfrm>
+          <a:off x="0" y="0"/>
+          <a:ext cx="0" cy="0"/>
+          <a:chOff x="0" y="0"/>
+          <a:chExt cx="0" cy="0"/>
+        </a:xfrm>
+      </p:grpSpPr>
+      <p:sp>
+        <p:nvSpPr>
+          <p:cNvPr id="98" name="TextShape 1"/>
+          <p:cNvSpPr txBox="1"/>
+          <p:nvPr/>
+        </p:nvSpPr>
+        <p:spPr>
+          <a:xfrm>
+            <a:off x="504000" y="301320"/>
+            <a:ext cx="9071640" cy="637560"/>
+          </a:xfrm>
+          <a:prstGeom prst="rect">
+            <a:avLst/>
+          </a:prstGeom>
+          <a:noFill/>
+          <a:ln>
+            <a:noFill/>
+          </a:ln>
+        </p:spPr>
+        <p:txBody>
+          <a:bodyPr lIns="0" rIns="0" tIns="0" bIns="0" anchor="ctr">
+            <a:spAutoFit/>
+          </a:bodyPr>
+          <a:p>
+            <a:pPr algn="ctr"/>
+            <a:r>
+              <a:rPr b="0" lang="en-US" sz="4400" spc="-1" strike="noStrike">
+                <a:solidFill>
+                  <a:srgbClr val="ffffff"/>
+                </a:solidFill>
+                <a:latin typeface="Arial"/>
+              </a:rPr>
+              <a:t>Pretraga</a:t>
+            </a:r>
+            <a:endParaRPr b="0" lang="en-US" sz="4400" spc="-1" strike="noStrike">
+              <a:solidFill>
+                <a:srgbClr val="ffffff"/>
+              </a:solidFill>
+              <a:latin typeface="Arial"/>
+            </a:endParaRPr>
+          </a:p>
+        </p:txBody>
+      </p:sp>
+      <p:sp>
+        <p:nvSpPr>
+          <p:cNvPr id="99" name="TextShape 2"/>
+          <p:cNvSpPr txBox="1"/>
+          <p:nvPr/>
+        </p:nvSpPr>
+        <p:spPr>
+          <a:xfrm>
+            <a:off x="504000" y="1769040"/>
+            <a:ext cx="9071640" cy="4384440"/>
+          </a:xfrm>
+          <a:prstGeom prst="rect">
+            <a:avLst/>
+          </a:prstGeom>
+          <a:noFill/>
+          <a:ln>
+            <a:noFill/>
+          </a:ln>
+        </p:spPr>
+        <p:txBody>
+          <a:bodyPr lIns="0" rIns="0" tIns="0" bIns="0">
+            <a:noAutofit/>
+          </a:bodyPr>
+          <a:p>
+            <a:pPr marL="432000" indent="-324000">
+              <a:spcBef>
+                <a:spcPts val="1417"/>
+              </a:spcBef>
+              <a:buClr>
+                <a:srgbClr val="000000"/>
+              </a:buClr>
+              <a:buSzPct val="45000"/>
+              <a:buFont typeface="Wingdings" charset="2"/>
+              <a:buChar char=""/>
+            </a:pPr>
+            <a:r>
+              <a:rPr b="0" lang="en-US" sz="3200" spc="-1" strike="noStrike">
+                <a:solidFill>
+                  <a:srgbClr val="0066cc"/>
+                </a:solidFill>
+                <a:latin typeface="Arial"/>
+              </a:rPr>
+              <a:t>Dve opcije pretrage:</a:t>
+            </a:r>
+            <a:endParaRPr b="0" lang="en-US" sz="3200" spc="-1" strike="noStrike">
+              <a:solidFill>
+                <a:srgbClr val="0066cc"/>
+              </a:solidFill>
+              <a:latin typeface="Arial"/>
+            </a:endParaRPr>
+          </a:p>
+          <a:p>
+            <a:pPr marL="432000" indent="-324000">
+              <a:spcBef>
+                <a:spcPts val="1417"/>
+              </a:spcBef>
+              <a:buClr>
+                <a:srgbClr val="000000"/>
+              </a:buClr>
+              <a:buSzPct val="45000"/>
+              <a:buFont typeface="Wingdings" charset="2"/>
+              <a:buChar char=""/>
+            </a:pPr>
+            <a:r>
+              <a:rPr b="0" lang="en-US" sz="3200" spc="-1" strike="noStrike">
+                <a:solidFill>
+                  <a:srgbClr val="0066cc"/>
+                </a:solidFill>
+                <a:latin typeface="Arial"/>
+              </a:rPr>
+              <a:t>Obicna pretraga</a:t>
+            </a:r>
+            <a:endParaRPr b="0" lang="en-US" sz="3200" spc="-1" strike="noStrike">
+              <a:solidFill>
+                <a:srgbClr val="0066cc"/>
+              </a:solidFill>
+              <a:latin typeface="Arial"/>
+            </a:endParaRPr>
+          </a:p>
+          <a:p>
+            <a:pPr marL="432000" indent="-324000">
+              <a:spcBef>
+                <a:spcPts val="1417"/>
+              </a:spcBef>
+              <a:buClr>
+                <a:srgbClr val="000000"/>
+              </a:buClr>
+              <a:buSzPct val="45000"/>
+              <a:buFont typeface="Wingdings" charset="2"/>
+              <a:buChar char=""/>
+            </a:pPr>
+            <a:r>
+              <a:rPr b="0" lang="en-US" sz="3200" spc="-1" strike="noStrike">
+                <a:solidFill>
+                  <a:srgbClr val="0066cc"/>
+                </a:solidFill>
+                <a:latin typeface="Arial"/>
+              </a:rPr>
+              <a:t>Napredna pretraga</a:t>
+            </a:r>
+            <a:endParaRPr b="0" lang="en-US" sz="3200" spc="-1" strike="noStrike">
+              <a:solidFill>
+                <a:srgbClr val="0066cc"/>
+              </a:solidFill>
+              <a:latin typeface="Arial"/>
+            </a:endParaRPr>
+          </a:p>
+        </p:txBody>
+      </p:sp>
+    </p:spTree>
+  </p:cSld>
+  <mc:AlternateContent>
+    <mc:Choice Requires="p14">
+      <p:transition spd="slow" p14:dur="2000"/>
+    </mc:Choice>
+    <mc:Fallback>
+      <p:transition spd="slow"/>
+    </mc:Fallback>
+  </mc:AlternateContent>
+</p:sld>
+</file>
+
+<file path=ppt/slides/slide8.xml><?xml version="1.0" encoding="utf-8"?>
+<p:sld xmlns:a="http://schemas.openxmlformats.org/drawingml/2006/main" xmlns:p="http://schemas.openxmlformats.org/presentationml/2006/main" xmlns:r="http://schemas.openxmlformats.org/officeDocument/2006/relationships" xmlns:p14="http://schemas.microsoft.com/office/powerpoint/2010/main" xmlns:p15="http://schemas.microsoft.com/office/powerpoint/2012/main" xmlns:mc="http://schemas.openxmlformats.org/markup-compatibility/2006">
+  <p:cSld>
+    <p:spTree>
+      <p:nvGrpSpPr>
+        <p:cNvPr id="1" name=""/>
+        <p:cNvGrpSpPr/>
+        <p:nvPr/>
+      </p:nvGrpSpPr>
+      <p:grpSpPr>
+        <a:xfrm>
+          <a:off x="0" y="0"/>
+          <a:ext cx="0" cy="0"/>
+          <a:chOff x="0" y="0"/>
+          <a:chExt cx="0" cy="0"/>
+        </a:xfrm>
+      </p:grpSpPr>
+      <p:sp>
+        <p:nvSpPr>
+          <p:cNvPr id="100" name="TextShape 1"/>
+          <p:cNvSpPr txBox="1"/>
+          <p:nvPr/>
+        </p:nvSpPr>
+        <p:spPr>
+          <a:xfrm>
+            <a:off x="504000" y="301320"/>
+            <a:ext cx="9071640" cy="637560"/>
+          </a:xfrm>
+          <a:prstGeom prst="rect">
+            <a:avLst/>
+          </a:prstGeom>
+          <a:noFill/>
+          <a:ln>
+            <a:noFill/>
+          </a:ln>
+        </p:spPr>
+        <p:txBody>
+          <a:bodyPr lIns="0" rIns="0" tIns="0" bIns="0" anchor="ctr">
+            <a:spAutoFit/>
+          </a:bodyPr>
+          <a:p>
+            <a:pPr algn="ctr"/>
+            <a:r>
+              <a:rPr b="0" lang="en-US" sz="4400" spc="-1" strike="noStrike">
+                <a:solidFill>
+                  <a:srgbClr val="ffffff"/>
+                </a:solidFill>
+                <a:latin typeface="Arial"/>
+              </a:rPr>
+              <a:t>Obicna pretraga</a:t>
+            </a:r>
+            <a:endParaRPr b="0" lang="en-US" sz="4400" spc="-1" strike="noStrike">
+              <a:solidFill>
+                <a:srgbClr val="ffffff"/>
+              </a:solidFill>
+              <a:latin typeface="Arial"/>
+            </a:endParaRPr>
+          </a:p>
+        </p:txBody>
+      </p:sp>
+      <p:sp>
+        <p:nvSpPr>
+          <p:cNvPr id="101" name="TextShape 2"/>
+          <p:cNvSpPr txBox="1"/>
+          <p:nvPr/>
+        </p:nvSpPr>
+        <p:spPr>
+          <a:xfrm>
+            <a:off x="504000" y="1769040"/>
+            <a:ext cx="9071640" cy="4384440"/>
+          </a:xfrm>
+          <a:prstGeom prst="rect">
+            <a:avLst/>
+          </a:prstGeom>
+          <a:noFill/>
+          <a:ln>
+            <a:noFill/>
+          </a:ln>
+        </p:spPr>
+        <p:txBody>
+          <a:bodyPr lIns="0" rIns="0" tIns="0" bIns="0">
+            <a:noAutofit/>
+          </a:bodyPr>
+          <a:p>
+            <a:pPr marL="432000" indent="-324000">
+              <a:spcBef>
+                <a:spcPts val="1417"/>
+              </a:spcBef>
+              <a:buClr>
+                <a:srgbClr val="000000"/>
+              </a:buClr>
+              <a:buSzPct val="45000"/>
+              <a:buFont typeface="Wingdings" charset="2"/>
+              <a:buChar char=""/>
+            </a:pPr>
+            <a:r>
+              <a:rPr b="0" lang="en-US" sz="3200" spc="-1" strike="noStrike">
+                <a:solidFill>
+                  <a:srgbClr val="0066cc"/>
+                </a:solidFill>
+                <a:latin typeface="Arial"/>
+              </a:rPr>
+              <a:t>Dozvoljeni upiti:</a:t>
+            </a:r>
+            <a:endParaRPr b="0" lang="en-US" sz="3200" spc="-1" strike="noStrike">
+              <a:solidFill>
+                <a:srgbClr val="0066cc"/>
+              </a:solidFill>
+              <a:latin typeface="Arial"/>
+            </a:endParaRPr>
+          </a:p>
+          <a:p>
+            <a:pPr lvl="1" marL="864000" indent="-324000">
+              <a:spcBef>
+                <a:spcPts val="1134"/>
+              </a:spcBef>
+              <a:buClr>
+                <a:srgbClr val="000000"/>
+              </a:buClr>
+              <a:buSzPct val="75000"/>
+              <a:buFont typeface="Symbol" charset="2"/>
+              <a:buChar char=""/>
+            </a:pPr>
+            <a:r>
+              <a:rPr b="0" lang="en-US" sz="2800" spc="-1" strike="noStrike">
+                <a:solidFill>
+                  <a:srgbClr val="0066cc"/>
+                </a:solidFill>
+                <a:latin typeface="Arial"/>
+              </a:rPr>
+              <a:t>python and java</a:t>
+            </a:r>
+            <a:endParaRPr b="0" lang="en-US" sz="2800" spc="-1" strike="noStrike">
+              <a:solidFill>
+                <a:srgbClr val="0066cc"/>
+              </a:solidFill>
+              <a:latin typeface="Arial"/>
+            </a:endParaRPr>
+          </a:p>
+          <a:p>
+            <a:pPr lvl="1" marL="864000" indent="-324000">
+              <a:spcBef>
+                <a:spcPts val="1134"/>
+              </a:spcBef>
+              <a:buClr>
+                <a:srgbClr val="000000"/>
+              </a:buClr>
+              <a:buSzPct val="75000"/>
+              <a:buFont typeface="Symbol" charset="2"/>
+              <a:buChar char=""/>
+            </a:pPr>
+            <a:r>
+              <a:rPr b="0" lang="en-US" sz="2800" spc="-1" strike="noStrike">
+                <a:solidFill>
+                  <a:srgbClr val="0066cc"/>
+                </a:solidFill>
+                <a:latin typeface="Arial"/>
+              </a:rPr>
+              <a:t>python or java</a:t>
+            </a:r>
+            <a:endParaRPr b="0" lang="en-US" sz="2800" spc="-1" strike="noStrike">
+              <a:solidFill>
+                <a:srgbClr val="0066cc"/>
+              </a:solidFill>
+              <a:latin typeface="Arial"/>
+            </a:endParaRPr>
+          </a:p>
+          <a:p>
+            <a:pPr lvl="1" marL="864000" indent="-324000">
+              <a:spcBef>
+                <a:spcPts val="1134"/>
+              </a:spcBef>
+              <a:buClr>
+                <a:srgbClr val="000000"/>
+              </a:buClr>
+              <a:buSzPct val="75000"/>
+              <a:buFont typeface="Symbol" charset="2"/>
+              <a:buChar char=""/>
+            </a:pPr>
+            <a:r>
+              <a:rPr b="0" lang="en-US" sz="2800" spc="-1" strike="noStrike">
+                <a:solidFill>
+                  <a:srgbClr val="0066cc"/>
+                </a:solidFill>
+                <a:latin typeface="Arial"/>
+              </a:rPr>
+              <a:t>python not java</a:t>
+            </a:r>
+            <a:endParaRPr b="0" lang="en-US" sz="2800" spc="-1" strike="noStrike">
+              <a:solidFill>
+                <a:srgbClr val="0066cc"/>
+              </a:solidFill>
+              <a:latin typeface="Arial"/>
+            </a:endParaRPr>
+          </a:p>
+          <a:p>
+            <a:pPr lvl="1" marL="864000" indent="-324000">
+              <a:spcBef>
+                <a:spcPts val="1134"/>
+              </a:spcBef>
+              <a:buClr>
+                <a:srgbClr val="000000"/>
+              </a:buClr>
+              <a:buSzPct val="75000"/>
+              <a:buFont typeface="Symbol" charset="2"/>
+              <a:buChar char=""/>
+            </a:pPr>
+            <a:r>
+              <a:rPr b="0" lang="en-US" sz="2800" spc="-1" strike="noStrike">
+                <a:solidFill>
+                  <a:srgbClr val="0066cc"/>
+                </a:solidFill>
+                <a:latin typeface="Arial"/>
+              </a:rPr>
+              <a:t>not python</a:t>
+            </a:r>
+            <a:endParaRPr b="0" lang="en-US" sz="2800" spc="-1" strike="noStrike">
+              <a:solidFill>
+                <a:srgbClr val="0066cc"/>
+              </a:solidFill>
+              <a:latin typeface="Arial"/>
+            </a:endParaRPr>
+          </a:p>
+          <a:p>
+            <a:pPr lvl="1" marL="864000" indent="-324000">
+              <a:spcBef>
+                <a:spcPts val="1134"/>
+              </a:spcBef>
+              <a:buClr>
+                <a:srgbClr val="000000"/>
+              </a:buClr>
+              <a:buSzPct val="75000"/>
+              <a:buFont typeface="Symbol" charset="2"/>
+              <a:buChar char=""/>
+            </a:pPr>
+            <a:r>
+              <a:rPr b="0" lang="en-US" sz="2800" spc="-1" strike="noStrike">
+                <a:solidFill>
+                  <a:srgbClr val="0066cc"/>
+                </a:solidFill>
+                <a:latin typeface="Arial"/>
+              </a:rPr>
+              <a:t>python programming language etc. </a:t>
+            </a:r>
+            <a:endParaRPr b="0" lang="en-US" sz="2800" spc="-1" strike="noStrike">
+              <a:solidFill>
+                <a:srgbClr val="0066cc"/>
+              </a:solidFill>
+              <a:latin typeface="Arial"/>
+            </a:endParaRPr>
+          </a:p>
+        </p:txBody>
+      </p:sp>
+    </p:spTree>
+  </p:cSld>
+  <mc:AlternateContent>
+    <mc:Choice Requires="p14">
+      <p:transition spd="slow" p14:dur="2000"/>
+    </mc:Choice>
+    <mc:Fallback>
+      <p:transition spd="slow"/>
+    </mc:Fallback>
+  </mc:AlternateContent>
+</p:sld>
+</file>
+
 <file path=ppt/slides/slide9.xml><?xml version="1.0" encoding="utf-8"?>
 <p:sld xmlns:a="http://schemas.openxmlformats.org/drawingml/2006/main" xmlns:p="http://schemas.openxmlformats.org/presentationml/2006/main" xmlns:r="http://schemas.openxmlformats.org/officeDocument/2006/relationships" xmlns:p14="http://schemas.microsoft.com/office/powerpoint/2010/main" xmlns:p15="http://schemas.microsoft.com/office/powerpoint/2012/main" xmlns:mc="http://schemas.openxmlformats.org/markup-compatibility/2006">
   <p:cSld>
@@ -5643,7 +5964,7 @@
                 </a:solidFill>
                 <a:latin typeface="Arial"/>
               </a:rPr>
-              <a:t>Napredna pretraga</a:t>
+              <a:t>Obicna pretraga</a:t>
             </a:r>
             <a:endParaRPr b="0" lang="en-US" sz="4400" spc="-1" strike="noStrike">
               <a:solidFill>
@@ -5696,7 +6017,7 @@
                 </a:solidFill>
                 <a:latin typeface="Arial"/>
               </a:rPr>
-              <a:t>Upiti koji zadovoljavaju:</a:t>
+              <a:t>Set:</a:t>
             </a:r>
             <a:endParaRPr b="0" lang="en-US" sz="3200" spc="-1" strike="noStrike">
               <a:solidFill>
@@ -5724,7 +6045,7 @@
                 </a:solidFill>
                 <a:latin typeface="Arial"/>
               </a:rPr>
-              <a:t>!(python&amp;&amp;java)  --- dozvoljeni su I razmaci</a:t>
+              <a:t>Pomocna struktura podataka koja sadrzi listu stranica koje zadovoljavaju trazeni upit.</a:t>
             </a:r>
             <a:endParaRPr b="0" lang="en-US" sz="2800" spc="-1" strike="noStrike">
               <a:solidFill>
@@ -5752,7 +6073,7 @@
                 </a:solidFill>
                 <a:latin typeface="Arial"/>
               </a:rPr>
-              <a:t>python || java</a:t>
+              <a:t>Za svaku rec upita odvaja se skup sa stranicama koje sadrze datu rec.</a:t>
             </a:r>
             <a:endParaRPr b="0" lang="en-US" sz="2800" spc="-1" strike="noStrike">
               <a:solidFill>
@@ -5780,7 +6101,7 @@
                 </a:solidFill>
                 <a:latin typeface="Arial"/>
               </a:rPr>
-              <a:t>python &amp;&amp; java || ! (programming || language) &amp;&amp; C</a:t>
+              <a:t>U setu se takodje nalaze osnovne skupovne operacije (unija, presek, razlika, komplement)</a:t>
             </a:r>
             <a:endParaRPr b="0" lang="en-US" sz="2800" spc="-1" strike="noStrike">
               <a:solidFill>
@@ -5808,7 +6129,7 @@
                 </a:solidFill>
                 <a:latin typeface="Arial"/>
               </a:rPr>
-              <a:t>...</a:t>
+              <a:t>Rezultujuci set je set koji se vraca pozivom neke od osnovnih skupovnih operacija</a:t>
             </a:r>
             <a:endParaRPr b="0" lang="en-US" sz="2800" spc="-1" strike="noStrike">
               <a:solidFill>
@@ -5829,6 +6150,33 @@
       <p:transition spd="slow"/>
     </mc:Fallback>
   </mc:AlternateContent>
+  <p:timing>
+    <p:tnLst>
+      <p:par>
+        <p:cTn id="9" dur="indefinite" restart="never" nodeType="tmRoot">
+          <p:childTnLst>
+            <p:seq>
+              <p:cTn id="10" dur="indefinite" nodeType="mainSeq"/>
+              <p:prevCondLst>
+                <p:cond delay="0" evt="onPrev">
+                  <p:tgtEl>
+                    <p:sldTgt/>
+                  </p:tgtEl>
+                </p:cond>
+              </p:prevCondLst>
+              <p:nextCondLst>
+                <p:cond delay="0" evt="onNext">
+                  <p:tgtEl>
+                    <p:sldTgt/>
+                  </p:tgtEl>
+                </p:cond>
+              </p:nextCondLst>
+            </p:seq>
+          </p:childTnLst>
+        </p:cTn>
+      </p:par>
+    </p:tnLst>
+  </p:timing>
 </p:sld>
 </file>
 

</xml_diff>

<commit_message>
dodata napredna pretraga u prezentaciju
</commit_message>
<xml_diff>
--- a/ProjekatPrezentacija.pptx
+++ b/ProjekatPrezentacija.pptx
@@ -17,6 +17,15 @@
     <p:sldId id="264" r:id="rId12"/>
     <p:sldId id="265" r:id="rId13"/>
     <p:sldId id="266" r:id="rId14"/>
+    <p:sldId id="267" r:id="rId15"/>
+    <p:sldId id="268" r:id="rId16"/>
+    <p:sldId id="269" r:id="rId17"/>
+    <p:sldId id="270" r:id="rId18"/>
+    <p:sldId id="271" r:id="rId19"/>
+    <p:sldId id="272" r:id="rId20"/>
+    <p:sldId id="273" r:id="rId21"/>
+    <p:sldId id="274" r:id="rId22"/>
+    <p:sldId id="275" r:id="rId23"/>
   </p:sldIdLst>
   <p:sldSz cx="10080625" cy="7559675"/>
   <p:notesSz cx="7559675" cy="10691812"/>
@@ -3299,7 +3308,7 @@
           </a:bodyPr>
           <a:p>
             <a:pPr algn="r"/>
-            <a:fld id="{F6791587-3AE2-4676-A317-A4AF51EBD159}" type="slidenum">
+            <a:fld id="{2A01CBF3-E87A-4B91-A7C2-6DEFE65EFA54}" type="slidenum">
               <a:rPr b="0" lang="en-US" sz="1400" spc="-1" strike="noStrike">
                 <a:latin typeface="Times New Roman"/>
               </a:rPr>
@@ -3782,7 +3791,7 @@
           </a:bodyPr>
           <a:p>
             <a:pPr algn="r"/>
-            <a:fld id="{13C46340-0C7F-42D4-BDF3-F3A032BC8F79}" type="slidenum">
+            <a:fld id="{E92C5054-D1CB-4C71-93D0-0BA515206F59}" type="slidenum">
               <a:rPr b="0" lang="en-US" sz="1400" spc="-1" strike="noStrike">
                 <a:latin typeface="Times New Roman"/>
               </a:rPr>
@@ -4167,6 +4176,15 @@
           </a:bodyPr>
           <a:p>
             <a:pPr algn="ctr"/>
+            <a:r>
+              <a:rPr b="0" lang="en-US" sz="4400" spc="-1" strike="noStrike">
+                <a:solidFill>
+                  <a:srgbClr val="ffffff"/>
+                </a:solidFill>
+                <a:latin typeface="Arial"/>
+              </a:rPr>
+              <a:t>Napredna pretraga</a:t>
+            </a:r>
             <a:endParaRPr b="0" lang="en-US" sz="4400" spc="-1" strike="noStrike">
               <a:solidFill>
                 <a:srgbClr val="ffffff"/>
@@ -4184,7 +4202,833 @@
         </p:nvSpPr>
         <p:spPr>
           <a:xfrm>
-            <a:off x="548640" y="1376280"/>
+            <a:off x="-19080" y="1005840"/>
+            <a:ext cx="9894600" cy="1005840"/>
+          </a:xfrm>
+          <a:prstGeom prst="rect">
+            <a:avLst/>
+          </a:prstGeom>
+          <a:noFill/>
+          <a:ln>
+            <a:noFill/>
+          </a:ln>
+        </p:spPr>
+        <p:txBody>
+          <a:bodyPr lIns="0" rIns="0" tIns="0" bIns="0">
+            <a:noAutofit/>
+          </a:bodyPr>
+          <a:p>
+            <a:pPr marL="432000" indent="-324000">
+              <a:spcBef>
+                <a:spcPts val="1134"/>
+              </a:spcBef>
+              <a:buClr>
+                <a:srgbClr val="000000"/>
+              </a:buClr>
+              <a:buSzPct val="45000"/>
+              <a:buFont typeface="Wingdings" charset="2"/>
+              <a:buChar char=""/>
+            </a:pPr>
+            <a:r>
+              <a:rPr b="0" lang="en-US" sz="3200" spc="-1" strike="noStrike">
+                <a:solidFill>
+                  <a:srgbClr val="0066cc"/>
+                </a:solidFill>
+                <a:latin typeface="Arial"/>
+              </a:rPr>
+              <a:t> </a:t>
+            </a:r>
+            <a:r>
+              <a:rPr b="0" lang="en-US" sz="3200" spc="-1" strike="noStrike">
+                <a:solidFill>
+                  <a:srgbClr val="0066cc"/>
+                </a:solidFill>
+                <a:latin typeface="Arial"/>
+              </a:rPr>
+              <a:t>zbog cuvanja prioriteta operacija neophodno je prvo infiksnu notaciju prebaciti u postfiksnu:</a:t>
+            </a:r>
+            <a:endParaRPr b="0" lang="en-US" sz="3200" spc="-1" strike="noStrike">
+              <a:solidFill>
+                <a:srgbClr val="0066cc"/>
+              </a:solidFill>
+              <a:latin typeface="Arial"/>
+            </a:endParaRPr>
+          </a:p>
+        </p:txBody>
+      </p:sp>
+      <p:sp>
+        <p:nvSpPr>
+          <p:cNvPr id="108" name="TextShape 3"/>
+          <p:cNvSpPr txBox="1"/>
+          <p:nvPr/>
+        </p:nvSpPr>
+        <p:spPr>
+          <a:xfrm>
+            <a:off x="-19080" y="1977480"/>
+            <a:ext cx="8797320" cy="4697640"/>
+          </a:xfrm>
+          <a:prstGeom prst="rect">
+            <a:avLst/>
+          </a:prstGeom>
+          <a:noFill/>
+          <a:ln>
+            <a:noFill/>
+          </a:ln>
+        </p:spPr>
+        <p:txBody>
+          <a:bodyPr lIns="90000" rIns="90000" tIns="45000" bIns="45000">
+            <a:spAutoFit/>
+          </a:bodyPr>
+          <a:p>
+            <a:r>
+              <a:rPr b="0" lang="en-US" sz="1800" spc="-1" strike="noStrike">
+                <a:latin typeface="Arial"/>
+              </a:rPr>
+              <a:t>Stack</a:t>
+            </a:r>
+            <a:endParaRPr b="0" lang="en-US" sz="1800" spc="-1" strike="noStrike">
+              <a:latin typeface="Arial"/>
+            </a:endParaRPr>
+          </a:p>
+          <a:p>
+            <a:r>
+              <a:rPr b="0" lang="en-US" sz="1800" spc="-1" strike="noStrike">
+                <a:latin typeface="Arial"/>
+              </a:rPr>
+              <a:t>Postfix </a:t>
+            </a:r>
+            <a:endParaRPr b="0" lang="en-US" sz="1800" spc="-1" strike="noStrike">
+              <a:latin typeface="Arial"/>
+            </a:endParaRPr>
+          </a:p>
+          <a:p>
+            <a:r>
+              <a:rPr b="0" lang="en-US" sz="1800" spc="-1" strike="noStrike">
+                <a:latin typeface="Arial"/>
+              </a:rPr>
+              <a:t>For token in tokens:</a:t>
+            </a:r>
+            <a:endParaRPr b="0" lang="en-US" sz="1800" spc="-1" strike="noStrike">
+              <a:latin typeface="Arial"/>
+            </a:endParaRPr>
+          </a:p>
+          <a:p>
+            <a:r>
+              <a:rPr b="0" lang="en-US" sz="1800" spc="-1" strike="noStrike">
+                <a:latin typeface="Arial"/>
+              </a:rPr>
+              <a:t>	</a:t>
+            </a:r>
+            <a:r>
+              <a:rPr b="0" lang="en-US" sz="1800" spc="-1" strike="noStrike">
+                <a:latin typeface="Arial"/>
+              </a:rPr>
+              <a:t>if token is ‘(‘:</a:t>
+            </a:r>
+            <a:endParaRPr b="0" lang="en-US" sz="1800" spc="-1" strike="noStrike">
+              <a:latin typeface="Arial"/>
+            </a:endParaRPr>
+          </a:p>
+          <a:p>
+            <a:r>
+              <a:rPr b="0" lang="en-US" sz="1800" spc="-1" strike="noStrike">
+                <a:latin typeface="Arial"/>
+              </a:rPr>
+              <a:t>	</a:t>
+            </a:r>
+            <a:r>
+              <a:rPr b="0" lang="en-US" sz="1800" spc="-1" strike="noStrike">
+                <a:latin typeface="Arial"/>
+              </a:rPr>
+              <a:t>	</a:t>
+            </a:r>
+            <a:r>
+              <a:rPr b="0" lang="en-US" sz="1800" spc="-1" strike="noStrike">
+                <a:latin typeface="Arial"/>
+              </a:rPr>
+              <a:t>stack.push(token)</a:t>
+            </a:r>
+            <a:endParaRPr b="0" lang="en-US" sz="1800" spc="-1" strike="noStrike">
+              <a:latin typeface="Arial"/>
+            </a:endParaRPr>
+          </a:p>
+          <a:p>
+            <a:r>
+              <a:rPr b="0" lang="en-US" sz="1800" spc="-1" strike="noStrike">
+                <a:latin typeface="Arial"/>
+              </a:rPr>
+              <a:t>      </a:t>
+            </a:r>
+            <a:r>
+              <a:rPr b="0" lang="en-US" sz="1800" spc="-1" strike="noStrike">
+                <a:latin typeface="Arial"/>
+              </a:rPr>
+              <a:t>Else if token is ‘)’:</a:t>
+            </a:r>
+            <a:endParaRPr b="0" lang="en-US" sz="1800" spc="-1" strike="noStrike">
+              <a:latin typeface="Arial"/>
+            </a:endParaRPr>
+          </a:p>
+          <a:p>
+            <a:r>
+              <a:rPr b="0" lang="en-US" sz="1800" spc="-1" strike="noStrike">
+                <a:latin typeface="Arial"/>
+              </a:rPr>
+              <a:t>	</a:t>
+            </a:r>
+            <a:r>
+              <a:rPr b="0" lang="en-US" sz="1800" spc="-1" strike="noStrike">
+                <a:latin typeface="Arial"/>
+              </a:rPr>
+              <a:t>	</a:t>
+            </a:r>
+            <a:r>
+              <a:rPr b="0" lang="en-US" sz="1800" spc="-1" strike="noStrike">
+                <a:latin typeface="Arial"/>
+              </a:rPr>
+              <a:t> </a:t>
+            </a:r>
+            <a:r>
+              <a:rPr b="0" lang="en-US" sz="1800" spc="-1" strike="noStrike">
+                <a:latin typeface="Arial"/>
+              </a:rPr>
+              <a:t>while 1:</a:t>
+            </a:r>
+            <a:endParaRPr b="0" lang="en-US" sz="1800" spc="-1" strike="noStrike">
+              <a:latin typeface="Arial"/>
+            </a:endParaRPr>
+          </a:p>
+          <a:p>
+            <a:r>
+              <a:rPr b="0" lang="en-US" sz="1800" spc="-1" strike="noStrike">
+                <a:latin typeface="Arial"/>
+              </a:rPr>
+              <a:t>	</a:t>
+            </a:r>
+            <a:r>
+              <a:rPr b="0" lang="en-US" sz="1800" spc="-1" strike="noStrike">
+                <a:latin typeface="Arial"/>
+              </a:rPr>
+              <a:t>	</a:t>
+            </a:r>
+            <a:r>
+              <a:rPr b="0" lang="en-US" sz="1800" spc="-1" strike="noStrike">
+                <a:latin typeface="Arial"/>
+              </a:rPr>
+              <a:t>	</a:t>
+            </a:r>
+            <a:r>
+              <a:rPr b="0" lang="en-US" sz="1800" spc="-1" strike="noStrike">
+                <a:latin typeface="Arial"/>
+              </a:rPr>
+              <a:t> </a:t>
+            </a:r>
+            <a:r>
+              <a:rPr b="0" lang="en-US" sz="1800" spc="-1" strike="noStrike">
+                <a:latin typeface="Arial"/>
+              </a:rPr>
+              <a:t>temp = stack.pop()</a:t>
+            </a:r>
+            <a:endParaRPr b="0" lang="en-US" sz="1800" spc="-1" strike="noStrike">
+              <a:latin typeface="Arial"/>
+            </a:endParaRPr>
+          </a:p>
+          <a:p>
+            <a:r>
+              <a:rPr b="0" lang="en-US" sz="1800" spc="-1" strike="noStrike">
+                <a:latin typeface="Arial"/>
+              </a:rPr>
+              <a:t>	</a:t>
+            </a:r>
+            <a:r>
+              <a:rPr b="0" lang="en-US" sz="1800" spc="-1" strike="noStrike">
+                <a:latin typeface="Arial"/>
+              </a:rPr>
+              <a:t>	</a:t>
+            </a:r>
+            <a:r>
+              <a:rPr b="0" lang="en-US" sz="1800" spc="-1" strike="noStrike">
+                <a:latin typeface="Arial"/>
+              </a:rPr>
+              <a:t>	</a:t>
+            </a:r>
+            <a:r>
+              <a:rPr b="0" lang="en-US" sz="1800" spc="-1" strike="noStrike">
+                <a:latin typeface="Arial"/>
+              </a:rPr>
+              <a:t> </a:t>
+            </a:r>
+            <a:r>
+              <a:rPr b="0" lang="en-US" sz="1800" spc="-1" strike="noStrike">
+                <a:latin typeface="Arial"/>
+              </a:rPr>
+              <a:t>if temp is ‘(‘:</a:t>
+            </a:r>
+            <a:endParaRPr b="0" lang="en-US" sz="1800" spc="-1" strike="noStrike">
+              <a:latin typeface="Arial"/>
+            </a:endParaRPr>
+          </a:p>
+          <a:p>
+            <a:r>
+              <a:rPr b="0" lang="en-US" sz="1800" spc="-1" strike="noStrike">
+                <a:latin typeface="Arial"/>
+              </a:rPr>
+              <a:t>	</a:t>
+            </a:r>
+            <a:r>
+              <a:rPr b="0" lang="en-US" sz="1800" spc="-1" strike="noStrike">
+                <a:latin typeface="Arial"/>
+              </a:rPr>
+              <a:t>	</a:t>
+            </a:r>
+            <a:r>
+              <a:rPr b="0" lang="en-US" sz="1800" spc="-1" strike="noStrike">
+                <a:latin typeface="Arial"/>
+              </a:rPr>
+              <a:t>	</a:t>
+            </a:r>
+            <a:r>
+              <a:rPr b="0" lang="en-US" sz="1800" spc="-1" strike="noStrike">
+                <a:latin typeface="Arial"/>
+              </a:rPr>
+              <a:t>	</a:t>
+            </a:r>
+            <a:r>
+              <a:rPr b="0" lang="en-US" sz="1800" spc="-1" strike="noStrike">
+                <a:latin typeface="Arial"/>
+              </a:rPr>
+              <a:t> </a:t>
+            </a:r>
+            <a:r>
+              <a:rPr b="0" lang="en-US" sz="1800" spc="-1" strike="noStrike">
+                <a:latin typeface="Arial"/>
+              </a:rPr>
+              <a:t>break</a:t>
+            </a:r>
+            <a:endParaRPr b="0" lang="en-US" sz="1800" spc="-1" strike="noStrike">
+              <a:latin typeface="Arial"/>
+            </a:endParaRPr>
+          </a:p>
+          <a:p>
+            <a:r>
+              <a:rPr b="0" lang="en-US" sz="1800" spc="-1" strike="noStrike">
+                <a:latin typeface="Arial"/>
+              </a:rPr>
+              <a:t>	</a:t>
+            </a:r>
+            <a:r>
+              <a:rPr b="0" lang="en-US" sz="1800" spc="-1" strike="noStrike">
+                <a:latin typeface="Arial"/>
+              </a:rPr>
+              <a:t>	</a:t>
+            </a:r>
+            <a:r>
+              <a:rPr b="0" lang="en-US" sz="1800" spc="-1" strike="noStrike">
+                <a:latin typeface="Arial"/>
+              </a:rPr>
+              <a:t>	</a:t>
+            </a:r>
+            <a:r>
+              <a:rPr b="0" lang="en-US" sz="1800" spc="-1" strike="noStrike">
+                <a:latin typeface="Arial"/>
+              </a:rPr>
+              <a:t> </a:t>
+            </a:r>
+            <a:r>
+              <a:rPr b="0" lang="en-US" sz="1800" spc="-1" strike="noStrike">
+                <a:latin typeface="Arial"/>
+              </a:rPr>
+              <a:t>else:</a:t>
+            </a:r>
+            <a:endParaRPr b="0" lang="en-US" sz="1800" spc="-1" strike="noStrike">
+              <a:latin typeface="Arial"/>
+            </a:endParaRPr>
+          </a:p>
+          <a:p>
+            <a:r>
+              <a:rPr b="0" lang="en-US" sz="1800" spc="-1" strike="noStrike">
+                <a:latin typeface="Arial"/>
+              </a:rPr>
+              <a:t>	</a:t>
+            </a:r>
+            <a:r>
+              <a:rPr b="0" lang="en-US" sz="1800" spc="-1" strike="noStrike">
+                <a:latin typeface="Arial"/>
+              </a:rPr>
+              <a:t>	</a:t>
+            </a:r>
+            <a:r>
+              <a:rPr b="0" lang="en-US" sz="1800" spc="-1" strike="noStrike">
+                <a:latin typeface="Arial"/>
+              </a:rPr>
+              <a:t>	</a:t>
+            </a:r>
+            <a:r>
+              <a:rPr b="0" lang="en-US" sz="1800" spc="-1" strike="noStrike">
+                <a:latin typeface="Arial"/>
+              </a:rPr>
+              <a:t>	</a:t>
+            </a:r>
+            <a:r>
+              <a:rPr b="0" lang="en-US" sz="1800" spc="-1" strike="noStrike">
+                <a:latin typeface="Arial"/>
+              </a:rPr>
+              <a:t> </a:t>
+            </a:r>
+            <a:r>
+              <a:rPr b="0" lang="en-US" sz="1800" spc="-1" strike="noStrike">
+                <a:latin typeface="Arial"/>
+              </a:rPr>
+              <a:t>postfix.add(temp)</a:t>
+            </a:r>
+            <a:endParaRPr b="0" lang="en-US" sz="1800" spc="-1" strike="noStrike">
+              <a:latin typeface="Arial"/>
+            </a:endParaRPr>
+          </a:p>
+          <a:p>
+            <a:r>
+              <a:rPr b="0" lang="en-US" sz="1800" spc="-1" strike="noStrike">
+                <a:latin typeface="Arial"/>
+              </a:rPr>
+              <a:t>	</a:t>
+            </a:r>
+            <a:r>
+              <a:rPr b="0" lang="en-US" sz="1800" spc="-1" strike="noStrike">
+                <a:latin typeface="Arial"/>
+              </a:rPr>
+              <a:t>Else if token is ‘&amp;&amp;’ or ‘||’ or token ‘!’:</a:t>
+            </a:r>
+            <a:endParaRPr b="0" lang="en-US" sz="1800" spc="-1" strike="noStrike">
+              <a:latin typeface="Arial"/>
+            </a:endParaRPr>
+          </a:p>
+          <a:p>
+            <a:r>
+              <a:rPr b="0" lang="en-US" sz="1800" spc="-1" strike="noStrike">
+                <a:latin typeface="Arial"/>
+              </a:rPr>
+              <a:t>	</a:t>
+            </a:r>
+            <a:r>
+              <a:rPr b="0" lang="en-US" sz="1800" spc="-1" strike="noStrike">
+                <a:latin typeface="Arial"/>
+              </a:rPr>
+              <a:t> </a:t>
+            </a:r>
+            <a:r>
+              <a:rPr b="0" lang="en-US" sz="1800" spc="-1" strike="noStrike">
+                <a:latin typeface="Arial"/>
+              </a:rPr>
+              <a:t>	</a:t>
+            </a:r>
+            <a:r>
+              <a:rPr b="0" lang="en-US" sz="1800" spc="-1" strike="noStrike">
+                <a:latin typeface="Arial"/>
+              </a:rPr>
+              <a:t>while stack is not empty and priority(stack.top()) &gt;= priority(token):</a:t>
+            </a:r>
+            <a:endParaRPr b="0" lang="en-US" sz="1800" spc="-1" strike="noStrike">
+              <a:latin typeface="Arial"/>
+            </a:endParaRPr>
+          </a:p>
+          <a:p>
+            <a:r>
+              <a:rPr b="0" lang="en-US" sz="1800" spc="-1" strike="noStrike">
+                <a:latin typeface="Arial"/>
+              </a:rPr>
+              <a:t>	</a:t>
+            </a:r>
+            <a:r>
+              <a:rPr b="0" lang="en-US" sz="1800" spc="-1" strike="noStrike">
+                <a:latin typeface="Arial"/>
+              </a:rPr>
+              <a:t>	</a:t>
+            </a:r>
+            <a:r>
+              <a:rPr b="0" lang="en-US" sz="1800" spc="-1" strike="noStrike">
+                <a:latin typeface="Arial"/>
+              </a:rPr>
+              <a:t> </a:t>
+            </a:r>
+            <a:r>
+              <a:rPr b="0" lang="en-US" sz="1800" spc="-1" strike="noStrike">
+                <a:latin typeface="Arial"/>
+              </a:rPr>
+              <a:t>	</a:t>
+            </a:r>
+            <a:r>
+              <a:rPr b="0" lang="en-US" sz="1800" spc="-1" strike="noStrike">
+                <a:latin typeface="Arial"/>
+              </a:rPr>
+              <a:t> </a:t>
+            </a:r>
+            <a:r>
+              <a:rPr b="0" lang="en-US" sz="1800" spc="-1" strike="noStrike">
+                <a:latin typeface="Arial"/>
+              </a:rPr>
+              <a:t>postfix.add(stack.pop())</a:t>
+            </a:r>
+            <a:endParaRPr b="0" lang="en-US" sz="1800" spc="-1" strike="noStrike">
+              <a:latin typeface="Arial"/>
+            </a:endParaRPr>
+          </a:p>
+          <a:p>
+            <a:r>
+              <a:rPr b="0" lang="en-US" sz="1800" spc="-1" strike="noStrike">
+                <a:latin typeface="Arial"/>
+              </a:rPr>
+              <a:t>	</a:t>
+            </a:r>
+            <a:r>
+              <a:rPr b="0" lang="en-US" sz="1800" spc="-1" strike="noStrike">
+                <a:latin typeface="Arial"/>
+              </a:rPr>
+              <a:t>	</a:t>
+            </a:r>
+            <a:r>
+              <a:rPr b="0" lang="en-US" sz="1800" spc="-1" strike="noStrike">
+                <a:latin typeface="Arial"/>
+              </a:rPr>
+              <a:t> </a:t>
+            </a:r>
+            <a:r>
+              <a:rPr b="0" lang="en-US" sz="1800" spc="-1" strike="noStrike">
+                <a:latin typeface="Arial"/>
+              </a:rPr>
+              <a:t>stack.push(token)</a:t>
+            </a:r>
+            <a:endParaRPr b="0" lang="en-US" sz="1800" spc="-1" strike="noStrike">
+              <a:latin typeface="Arial"/>
+            </a:endParaRPr>
+          </a:p>
+          <a:p>
+            <a:r>
+              <a:rPr b="0" lang="en-US" sz="1800" spc="-1" strike="noStrike">
+                <a:latin typeface="Arial"/>
+              </a:rPr>
+              <a:t>	</a:t>
+            </a:r>
+            <a:r>
+              <a:rPr b="0" lang="en-US" sz="1800" spc="-1" strike="noStrike">
+                <a:latin typeface="Arial"/>
+              </a:rPr>
+              <a:t>else: </a:t>
+            </a:r>
+            <a:endParaRPr b="0" lang="en-US" sz="1800" spc="-1" strike="noStrike">
+              <a:latin typeface="Arial"/>
+            </a:endParaRPr>
+          </a:p>
+          <a:p>
+            <a:r>
+              <a:rPr b="0" lang="en-US" sz="1800" spc="-1" strike="noStrike">
+                <a:latin typeface="Arial"/>
+              </a:rPr>
+              <a:t>	</a:t>
+            </a:r>
+            <a:r>
+              <a:rPr b="0" lang="en-US" sz="1800" spc="-1" strike="noStrike">
+                <a:latin typeface="Arial"/>
+              </a:rPr>
+              <a:t>	</a:t>
+            </a:r>
+            <a:r>
+              <a:rPr b="0" lang="en-US" sz="1800" spc="-1" strike="noStrike">
+                <a:latin typeface="Arial"/>
+              </a:rPr>
+              <a:t>postfix.add(token)</a:t>
+            </a:r>
+            <a:endParaRPr b="0" lang="en-US" sz="1800" spc="-1" strike="noStrike">
+              <a:latin typeface="Arial"/>
+            </a:endParaRPr>
+          </a:p>
+        </p:txBody>
+      </p:sp>
+      <p:sp>
+        <p:nvSpPr>
+          <p:cNvPr id="109" name="CustomShape 4"/>
+          <p:cNvSpPr/>
+          <p:nvPr/>
+        </p:nvSpPr>
+        <p:spPr>
+          <a:xfrm>
+            <a:off x="6766560" y="3840480"/>
+            <a:ext cx="1828800" cy="640080"/>
+          </a:xfrm>
+          <a:prstGeom prst="rect">
+            <a:avLst/>
+          </a:prstGeom>
+          <a:solidFill>
+            <a:srgbClr val="729fcf"/>
+          </a:solidFill>
+          <a:ln>
+            <a:solidFill>
+              <a:srgbClr val="3465a4"/>
+            </a:solidFill>
+          </a:ln>
+        </p:spPr>
+        <p:style>
+          <a:lnRef idx="0"/>
+          <a:fillRef idx="0"/>
+          <a:effectRef idx="0"/>
+          <a:fontRef idx="minor"/>
+        </p:style>
+        <p:txBody>
+          <a:bodyPr wrap="none" lIns="90000" rIns="90000" tIns="45000" bIns="45000" anchor="ctr">
+            <a:noAutofit/>
+          </a:bodyPr>
+          <a:p>
+            <a:pPr algn="ctr"/>
+            <a:r>
+              <a:rPr b="0" lang="en-US" sz="1800" spc="-1" strike="noStrike">
+                <a:latin typeface="Arial"/>
+              </a:rPr>
+              <a:t>(</a:t>
+            </a:r>
+            <a:endParaRPr b="0" lang="en-US" sz="1800" spc="-1" strike="noStrike">
+              <a:latin typeface="Arial"/>
+            </a:endParaRPr>
+          </a:p>
+        </p:txBody>
+      </p:sp>
+      <p:sp>
+        <p:nvSpPr>
+          <p:cNvPr id="110" name="CustomShape 5"/>
+          <p:cNvSpPr/>
+          <p:nvPr/>
+        </p:nvSpPr>
+        <p:spPr>
+          <a:xfrm>
+            <a:off x="6766560" y="3108960"/>
+            <a:ext cx="1828800" cy="731520"/>
+          </a:xfrm>
+          <a:prstGeom prst="rect">
+            <a:avLst/>
+          </a:prstGeom>
+          <a:solidFill>
+            <a:srgbClr val="729fcf"/>
+          </a:solidFill>
+          <a:ln>
+            <a:solidFill>
+              <a:srgbClr val="3465a4"/>
+            </a:solidFill>
+          </a:ln>
+        </p:spPr>
+        <p:style>
+          <a:lnRef idx="0"/>
+          <a:fillRef idx="0"/>
+          <a:effectRef idx="0"/>
+          <a:fontRef idx="minor"/>
+        </p:style>
+        <p:txBody>
+          <a:bodyPr wrap="none" lIns="90000" rIns="90000" tIns="45000" bIns="45000" anchor="ctr">
+            <a:noAutofit/>
+          </a:bodyPr>
+          <a:p>
+            <a:pPr algn="ctr"/>
+            <a:r>
+              <a:rPr b="0" lang="en-US" sz="1800" spc="-1" strike="noStrike">
+                <a:latin typeface="Arial"/>
+              </a:rPr>
+              <a:t>&amp;&amp;</a:t>
+            </a:r>
+            <a:endParaRPr b="0" lang="en-US" sz="1800" spc="-1" strike="noStrike">
+              <a:latin typeface="Arial"/>
+            </a:endParaRPr>
+          </a:p>
+        </p:txBody>
+      </p:sp>
+      <p:sp>
+        <p:nvSpPr>
+          <p:cNvPr id="111" name="CustomShape 6"/>
+          <p:cNvSpPr/>
+          <p:nvPr/>
+        </p:nvSpPr>
+        <p:spPr>
+          <a:xfrm>
+            <a:off x="6766560" y="2286000"/>
+            <a:ext cx="1828800" cy="822960"/>
+          </a:xfrm>
+          <a:prstGeom prst="rect">
+            <a:avLst/>
+          </a:prstGeom>
+          <a:solidFill>
+            <a:srgbClr val="729fcf"/>
+          </a:solidFill>
+          <a:ln>
+            <a:solidFill>
+              <a:srgbClr val="3465a4"/>
+            </a:solidFill>
+          </a:ln>
+        </p:spPr>
+        <p:style>
+          <a:lnRef idx="0"/>
+          <a:fillRef idx="0"/>
+          <a:effectRef idx="0"/>
+          <a:fontRef idx="minor"/>
+        </p:style>
+      </p:sp>
+      <p:sp>
+        <p:nvSpPr>
+          <p:cNvPr id="112" name="TextShape 7"/>
+          <p:cNvSpPr txBox="1"/>
+          <p:nvPr/>
+        </p:nvSpPr>
+        <p:spPr>
+          <a:xfrm>
+            <a:off x="53640" y="6684480"/>
+            <a:ext cx="6309360" cy="602280"/>
+          </a:xfrm>
+          <a:prstGeom prst="rect">
+            <a:avLst/>
+          </a:prstGeom>
+          <a:noFill/>
+          <a:ln>
+            <a:noFill/>
+          </a:ln>
+        </p:spPr>
+        <p:txBody>
+          <a:bodyPr lIns="90000" rIns="90000" tIns="45000" bIns="45000">
+            <a:spAutoFit/>
+          </a:bodyPr>
+          <a:p>
+            <a:r>
+              <a:rPr b="0" lang="en-US" sz="1800" spc="-1" strike="noStrike">
+                <a:latin typeface="Arial"/>
+              </a:rPr>
+              <a:t>while stack is not empty:</a:t>
+            </a:r>
+            <a:endParaRPr b="0" lang="en-US" sz="1800" spc="-1" strike="noStrike">
+              <a:latin typeface="Arial"/>
+            </a:endParaRPr>
+          </a:p>
+          <a:p>
+            <a:r>
+              <a:rPr b="0" lang="en-US" sz="1800" spc="-1" strike="noStrike">
+                <a:latin typeface="Arial"/>
+              </a:rPr>
+              <a:t>	</a:t>
+            </a:r>
+            <a:r>
+              <a:rPr b="0" lang="en-US" sz="1800" spc="-1" strike="noStrike">
+                <a:latin typeface="Arial"/>
+              </a:rPr>
+              <a:t>postfix.add(stack.pop())</a:t>
+            </a:r>
+            <a:endParaRPr b="0" lang="en-US" sz="1800" spc="-1" strike="noStrike">
+              <a:latin typeface="Arial"/>
+            </a:endParaRPr>
+          </a:p>
+        </p:txBody>
+      </p:sp>
+    </p:spTree>
+  </p:cSld>
+  <mc:AlternateContent>
+    <mc:Choice Requires="p14">
+      <p:transition spd="slow" p14:dur="2000"/>
+    </mc:Choice>
+    <mc:Fallback>
+      <p:transition spd="slow"/>
+    </mc:Fallback>
+  </mc:AlternateContent>
+  <p:timing>
+    <p:tnLst>
+      <p:par>
+        <p:cTn id="11" dur="indefinite" restart="never" nodeType="tmRoot">
+          <p:childTnLst>
+            <p:seq>
+              <p:cTn id="12" dur="indefinite" nodeType="mainSeq"/>
+              <p:prevCondLst>
+                <p:cond delay="0" evt="onPrev">
+                  <p:tgtEl>
+                    <p:sldTgt/>
+                  </p:tgtEl>
+                </p:cond>
+              </p:prevCondLst>
+              <p:nextCondLst>
+                <p:cond delay="0" evt="onNext">
+                  <p:tgtEl>
+                    <p:sldTgt/>
+                  </p:tgtEl>
+                </p:cond>
+              </p:nextCondLst>
+            </p:seq>
+          </p:childTnLst>
+        </p:cTn>
+      </p:par>
+    </p:tnLst>
+  </p:timing>
+</p:sld>
+</file>
+
+<file path=ppt/slides/slide12.xml><?xml version="1.0" encoding="utf-8"?>
+<p:sld xmlns:a="http://schemas.openxmlformats.org/drawingml/2006/main" xmlns:p="http://schemas.openxmlformats.org/presentationml/2006/main" xmlns:r="http://schemas.openxmlformats.org/officeDocument/2006/relationships" xmlns:p14="http://schemas.microsoft.com/office/powerpoint/2010/main" xmlns:p15="http://schemas.microsoft.com/office/powerpoint/2012/main" xmlns:mc="http://schemas.openxmlformats.org/markup-compatibility/2006">
+  <p:cSld>
+    <p:spTree>
+      <p:nvGrpSpPr>
+        <p:cNvPr id="1" name=""/>
+        <p:cNvGrpSpPr/>
+        <p:nvPr/>
+      </p:nvGrpSpPr>
+      <p:grpSpPr>
+        <a:xfrm>
+          <a:off x="0" y="0"/>
+          <a:ext cx="0" cy="0"/>
+          <a:chOff x="0" y="0"/>
+          <a:chExt cx="0" cy="0"/>
+        </a:xfrm>
+      </p:grpSpPr>
+      <p:sp>
+        <p:nvSpPr>
+          <p:cNvPr id="113" name="TextShape 1"/>
+          <p:cNvSpPr txBox="1"/>
+          <p:nvPr/>
+        </p:nvSpPr>
+        <p:spPr>
+          <a:xfrm>
+            <a:off x="504000" y="301320"/>
+            <a:ext cx="9071640" cy="637560"/>
+          </a:xfrm>
+          <a:prstGeom prst="rect">
+            <a:avLst/>
+          </a:prstGeom>
+          <a:noFill/>
+          <a:ln>
+            <a:noFill/>
+          </a:ln>
+        </p:spPr>
+        <p:txBody>
+          <a:bodyPr lIns="0" rIns="0" tIns="0" bIns="0" anchor="ctr">
+            <a:spAutoFit/>
+          </a:bodyPr>
+          <a:p>
+            <a:pPr algn="ctr"/>
+            <a:r>
+              <a:rPr b="0" lang="en-US" sz="4400" spc="-1" strike="noStrike">
+                <a:solidFill>
+                  <a:srgbClr val="ffffff"/>
+                </a:solidFill>
+                <a:latin typeface="Arial"/>
+              </a:rPr>
+              <a:t>Napredna pretraga</a:t>
+            </a:r>
+            <a:endParaRPr b="0" lang="en-US" sz="4400" spc="-1" strike="noStrike">
+              <a:solidFill>
+                <a:srgbClr val="ffffff"/>
+              </a:solidFill>
+              <a:latin typeface="Arial"/>
+            </a:endParaRPr>
+          </a:p>
+        </p:txBody>
+      </p:sp>
+      <p:sp>
+        <p:nvSpPr>
+          <p:cNvPr id="114" name="TextShape 2"/>
+          <p:cNvSpPr txBox="1"/>
+          <p:nvPr/>
+        </p:nvSpPr>
+        <p:spPr>
+          <a:xfrm>
+            <a:off x="504000" y="1769040"/>
             <a:ext cx="9071640" cy="4384440"/>
           </a:xfrm>
           <a:prstGeom prst="rect">
@@ -4218,7 +5062,7 @@
                 </a:solidFill>
                 <a:latin typeface="Arial"/>
               </a:rPr>
-              <a:t> </a:t>
+              <a:t>Recima: ako je token ‘(‘ dodaj na stek. Kad naletis na ‘)’ skidaj sve sa steka I redjaj u postfiksni string dok ne naletis na ‘(‘ ili kraj. Do tad je poslagano sve kako treba.</a:t>
             </a:r>
             <a:endParaRPr b="0" lang="en-US" sz="3200" spc="-1" strike="noStrike">
               <a:solidFill>
@@ -4246,12 +5090,2234 @@
                 </a:solidFill>
                 <a:latin typeface="Arial"/>
               </a:rPr>
-              <a:t> </a:t>
+              <a:t>Ako naletis na operator: </a:t>
             </a:r>
             <a:endParaRPr b="0" lang="en-US" sz="3200" spc="-1" strike="noStrike">
               <a:solidFill>
                 <a:srgbClr val="0066cc"/>
               </a:solidFill>
+              <a:latin typeface="Arial"/>
+            </a:endParaRPr>
+          </a:p>
+          <a:p>
+            <a:pPr lvl="1" marL="864000" indent="-324000">
+              <a:spcBef>
+                <a:spcPts val="1134"/>
+              </a:spcBef>
+              <a:buClr>
+                <a:srgbClr val="000000"/>
+              </a:buClr>
+              <a:buSzPct val="75000"/>
+              <a:buFont typeface="Symbol" charset="2"/>
+              <a:buChar char=""/>
+            </a:pPr>
+            <a:r>
+              <a:rPr b="0" lang="en-US" sz="2800" spc="-1" strike="noStrike">
+                <a:solidFill>
+                  <a:srgbClr val="0066cc"/>
+                </a:solidFill>
+                <a:latin typeface="Arial"/>
+              </a:rPr>
+              <a:t>Skidaj sa steka sve dok nije prazan ili dok prioritet sledeceg na steku nije veci od prioriteta datog tokena I redom dodaj u postfiksnu.</a:t>
+            </a:r>
+            <a:endParaRPr b="0" lang="en-US" sz="2800" spc="-1" strike="noStrike">
+              <a:solidFill>
+                <a:srgbClr val="0066cc"/>
+              </a:solidFill>
+              <a:latin typeface="Arial"/>
+            </a:endParaRPr>
+          </a:p>
+          <a:p>
+            <a:pPr lvl="1" marL="864000" indent="-324000">
+              <a:spcBef>
+                <a:spcPts val="1134"/>
+              </a:spcBef>
+              <a:buClr>
+                <a:srgbClr val="000000"/>
+              </a:buClr>
+              <a:buSzPct val="75000"/>
+              <a:buFont typeface="Symbol" charset="2"/>
+              <a:buChar char=""/>
+            </a:pPr>
+            <a:r>
+              <a:rPr b="0" lang="en-US" sz="2800" spc="-1" strike="noStrike">
+                <a:solidFill>
+                  <a:srgbClr val="0066cc"/>
+                </a:solidFill>
+                <a:latin typeface="Arial"/>
+              </a:rPr>
+              <a:t>Posle toga dodaj token u stek.</a:t>
+            </a:r>
+            <a:endParaRPr b="0" lang="en-US" sz="2800" spc="-1" strike="noStrike">
+              <a:solidFill>
+                <a:srgbClr val="0066cc"/>
+              </a:solidFill>
+              <a:latin typeface="Arial"/>
+            </a:endParaRPr>
+          </a:p>
+        </p:txBody>
+      </p:sp>
+    </p:spTree>
+  </p:cSld>
+  <mc:AlternateContent>
+    <mc:Choice Requires="p14">
+      <p:transition spd="slow" p14:dur="2000"/>
+    </mc:Choice>
+    <mc:Fallback>
+      <p:transition spd="slow"/>
+    </mc:Fallback>
+  </mc:AlternateContent>
+  <p:timing>
+    <p:tnLst>
+      <p:par>
+        <p:cTn id="13" dur="indefinite" restart="never" nodeType="tmRoot">
+          <p:childTnLst>
+            <p:seq>
+              <p:cTn id="14" dur="indefinite" nodeType="mainSeq"/>
+              <p:prevCondLst>
+                <p:cond delay="0" evt="onPrev">
+                  <p:tgtEl>
+                    <p:sldTgt/>
+                  </p:tgtEl>
+                </p:cond>
+              </p:prevCondLst>
+              <p:nextCondLst>
+                <p:cond delay="0" evt="onNext">
+                  <p:tgtEl>
+                    <p:sldTgt/>
+                  </p:tgtEl>
+                </p:cond>
+              </p:nextCondLst>
+            </p:seq>
+          </p:childTnLst>
+        </p:cTn>
+      </p:par>
+    </p:tnLst>
+  </p:timing>
+</p:sld>
+</file>
+
+<file path=ppt/slides/slide13.xml><?xml version="1.0" encoding="utf-8"?>
+<p:sld xmlns:a="http://schemas.openxmlformats.org/drawingml/2006/main" xmlns:p="http://schemas.openxmlformats.org/presentationml/2006/main" xmlns:r="http://schemas.openxmlformats.org/officeDocument/2006/relationships" xmlns:p14="http://schemas.microsoft.com/office/powerpoint/2010/main" xmlns:p15="http://schemas.microsoft.com/office/powerpoint/2012/main" xmlns:mc="http://schemas.openxmlformats.org/markup-compatibility/2006">
+  <p:cSld>
+    <p:spTree>
+      <p:nvGrpSpPr>
+        <p:cNvPr id="1" name=""/>
+        <p:cNvGrpSpPr/>
+        <p:nvPr/>
+      </p:nvGrpSpPr>
+      <p:grpSpPr>
+        <a:xfrm>
+          <a:off x="0" y="0"/>
+          <a:ext cx="0" cy="0"/>
+          <a:chOff x="0" y="0"/>
+          <a:chExt cx="0" cy="0"/>
+        </a:xfrm>
+      </p:grpSpPr>
+      <p:sp>
+        <p:nvSpPr>
+          <p:cNvPr id="115" name="TextShape 1"/>
+          <p:cNvSpPr txBox="1"/>
+          <p:nvPr/>
+        </p:nvSpPr>
+        <p:spPr>
+          <a:xfrm>
+            <a:off x="504000" y="301320"/>
+            <a:ext cx="9071640" cy="637560"/>
+          </a:xfrm>
+          <a:prstGeom prst="rect">
+            <a:avLst/>
+          </a:prstGeom>
+          <a:noFill/>
+          <a:ln>
+            <a:noFill/>
+          </a:ln>
+        </p:spPr>
+        <p:txBody>
+          <a:bodyPr lIns="0" rIns="0" tIns="0" bIns="0" anchor="ctr">
+            <a:spAutoFit/>
+          </a:bodyPr>
+          <a:p>
+            <a:pPr algn="ctr"/>
+            <a:r>
+              <a:rPr b="0" lang="en-US" sz="4400" spc="-1" strike="noStrike">
+                <a:solidFill>
+                  <a:srgbClr val="ffffff"/>
+                </a:solidFill>
+                <a:latin typeface="Arial"/>
+              </a:rPr>
+              <a:t>Napredna pretraga</a:t>
+            </a:r>
+            <a:endParaRPr b="0" lang="en-US" sz="4400" spc="-1" strike="noStrike">
+              <a:solidFill>
+                <a:srgbClr val="ffffff"/>
+              </a:solidFill>
+              <a:latin typeface="Arial"/>
+            </a:endParaRPr>
+          </a:p>
+        </p:txBody>
+      </p:sp>
+      <p:sp>
+        <p:nvSpPr>
+          <p:cNvPr id="116" name="TextShape 2"/>
+          <p:cNvSpPr txBox="1"/>
+          <p:nvPr/>
+        </p:nvSpPr>
+        <p:spPr>
+          <a:xfrm>
+            <a:off x="274320" y="1284840"/>
+            <a:ext cx="9071640" cy="4384440"/>
+          </a:xfrm>
+          <a:prstGeom prst="rect">
+            <a:avLst/>
+          </a:prstGeom>
+          <a:noFill/>
+          <a:ln>
+            <a:noFill/>
+          </a:ln>
+        </p:spPr>
+        <p:txBody>
+          <a:bodyPr lIns="0" rIns="0" tIns="0" bIns="0">
+            <a:noAutofit/>
+          </a:bodyPr>
+          <a:p>
+            <a:pPr marL="432000" indent="-324000">
+              <a:spcBef>
+                <a:spcPts val="1417"/>
+              </a:spcBef>
+              <a:buClr>
+                <a:srgbClr val="000000"/>
+              </a:buClr>
+              <a:buSzPct val="45000"/>
+              <a:buFont typeface="Wingdings" charset="2"/>
+              <a:buChar char=""/>
+            </a:pPr>
+            <a:r>
+              <a:rPr b="0" lang="en-US" sz="3200" spc="-1" strike="noStrike">
+                <a:solidFill>
+                  <a:srgbClr val="0066cc"/>
+                </a:solidFill>
+                <a:latin typeface="Arial"/>
+              </a:rPr>
+              <a:t>U svim drugim slucajevima je rec, dakle samo se dodaje na string za postfiksnu.</a:t>
+            </a:r>
+            <a:endParaRPr b="0" lang="en-US" sz="3200" spc="-1" strike="noStrike">
+              <a:solidFill>
+                <a:srgbClr val="0066cc"/>
+              </a:solidFill>
+              <a:latin typeface="Arial"/>
+            </a:endParaRPr>
+          </a:p>
+          <a:p>
+            <a:pPr marL="432000" indent="-324000">
+              <a:spcBef>
+                <a:spcPts val="1417"/>
+              </a:spcBef>
+              <a:buClr>
+                <a:srgbClr val="000000"/>
+              </a:buClr>
+              <a:buSzPct val="45000"/>
+              <a:buFont typeface="Wingdings" charset="2"/>
+              <a:buChar char=""/>
+            </a:pPr>
+            <a:r>
+              <a:rPr b="0" lang="en-US" sz="3200" spc="-1" strike="noStrike">
+                <a:solidFill>
+                  <a:srgbClr val="0066cc"/>
+                </a:solidFill>
+                <a:latin typeface="Arial"/>
+              </a:rPr>
+              <a:t>Nakon toga sledi jednostavno dodavanje I stvaranje stabla za parsiranje.</a:t>
+            </a:r>
+            <a:endParaRPr b="0" lang="en-US" sz="3200" spc="-1" strike="noStrike">
+              <a:solidFill>
+                <a:srgbClr val="0066cc"/>
+              </a:solidFill>
+              <a:latin typeface="Arial"/>
+            </a:endParaRPr>
+          </a:p>
+          <a:p>
+            <a:pPr marL="432000" indent="-324000">
+              <a:spcBef>
+                <a:spcPts val="1417"/>
+              </a:spcBef>
+              <a:buClr>
+                <a:srgbClr val="000000"/>
+              </a:buClr>
+              <a:buSzPct val="45000"/>
+              <a:buFont typeface="Wingdings" charset="2"/>
+              <a:buChar char=""/>
+            </a:pPr>
+            <a:r>
+              <a:rPr b="0" lang="en-US" sz="3200" spc="-1" strike="noStrike">
+                <a:solidFill>
+                  <a:srgbClr val="0066cc"/>
+                </a:solidFill>
+                <a:latin typeface="Arial"/>
+              </a:rPr>
+              <a:t>Stablo je binarno, za svaki operator listovi su reci. To treba da rezultuje skupom.</a:t>
+            </a:r>
+            <a:endParaRPr b="0" lang="en-US" sz="3200" spc="-1" strike="noStrike">
+              <a:solidFill>
+                <a:srgbClr val="0066cc"/>
+              </a:solidFill>
+              <a:latin typeface="Arial"/>
+            </a:endParaRPr>
+          </a:p>
+        </p:txBody>
+      </p:sp>
+    </p:spTree>
+  </p:cSld>
+  <mc:AlternateContent>
+    <mc:Choice Requires="p14">
+      <p:transition spd="slow" p14:dur="2000"/>
+    </mc:Choice>
+    <mc:Fallback>
+      <p:transition spd="slow"/>
+    </mc:Fallback>
+  </mc:AlternateContent>
+  <p:timing>
+    <p:tnLst>
+      <p:par>
+        <p:cTn id="15" dur="indefinite" restart="never" nodeType="tmRoot">
+          <p:childTnLst>
+            <p:seq>
+              <p:cTn id="16" dur="indefinite" nodeType="mainSeq"/>
+              <p:prevCondLst>
+                <p:cond delay="0" evt="onPrev">
+                  <p:tgtEl>
+                    <p:sldTgt/>
+                  </p:tgtEl>
+                </p:cond>
+              </p:prevCondLst>
+              <p:nextCondLst>
+                <p:cond delay="0" evt="onNext">
+                  <p:tgtEl>
+                    <p:sldTgt/>
+                  </p:tgtEl>
+                </p:cond>
+              </p:nextCondLst>
+            </p:seq>
+          </p:childTnLst>
+        </p:cTn>
+      </p:par>
+    </p:tnLst>
+  </p:timing>
+</p:sld>
+</file>
+
+<file path=ppt/slides/slide14.xml><?xml version="1.0" encoding="utf-8"?>
+<p:sld xmlns:a="http://schemas.openxmlformats.org/drawingml/2006/main" xmlns:p="http://schemas.openxmlformats.org/presentationml/2006/main" xmlns:r="http://schemas.openxmlformats.org/officeDocument/2006/relationships" xmlns:p14="http://schemas.microsoft.com/office/powerpoint/2010/main" xmlns:p15="http://schemas.microsoft.com/office/powerpoint/2012/main" xmlns:mc="http://schemas.openxmlformats.org/markup-compatibility/2006">
+  <p:cSld>
+    <p:spTree>
+      <p:nvGrpSpPr>
+        <p:cNvPr id="1" name=""/>
+        <p:cNvGrpSpPr/>
+        <p:nvPr/>
+      </p:nvGrpSpPr>
+      <p:grpSpPr>
+        <a:xfrm>
+          <a:off x="0" y="0"/>
+          <a:ext cx="0" cy="0"/>
+          <a:chOff x="0" y="0"/>
+          <a:chExt cx="0" cy="0"/>
+        </a:xfrm>
+      </p:grpSpPr>
+      <p:sp>
+        <p:nvSpPr>
+          <p:cNvPr id="117" name="TextShape 1"/>
+          <p:cNvSpPr txBox="1"/>
+          <p:nvPr/>
+        </p:nvSpPr>
+        <p:spPr>
+          <a:xfrm>
+            <a:off x="504000" y="301320"/>
+            <a:ext cx="9071640" cy="637560"/>
+          </a:xfrm>
+          <a:prstGeom prst="rect">
+            <a:avLst/>
+          </a:prstGeom>
+          <a:noFill/>
+          <a:ln>
+            <a:noFill/>
+          </a:ln>
+        </p:spPr>
+        <p:txBody>
+          <a:bodyPr lIns="0" rIns="0" tIns="0" bIns="0" anchor="ctr">
+            <a:spAutoFit/>
+          </a:bodyPr>
+          <a:p>
+            <a:pPr algn="ctr"/>
+            <a:r>
+              <a:rPr b="0" lang="en-US" sz="4400" spc="-1" strike="noStrike">
+                <a:solidFill>
+                  <a:srgbClr val="ffffff"/>
+                </a:solidFill>
+                <a:latin typeface="Arial"/>
+              </a:rPr>
+              <a:t>Napredna pretraga</a:t>
+            </a:r>
+            <a:endParaRPr b="0" lang="en-US" sz="4400" spc="-1" strike="noStrike">
+              <a:solidFill>
+                <a:srgbClr val="ffffff"/>
+              </a:solidFill>
+              <a:latin typeface="Arial"/>
+            </a:endParaRPr>
+          </a:p>
+        </p:txBody>
+      </p:sp>
+      <p:sp>
+        <p:nvSpPr>
+          <p:cNvPr id="118" name="TextShape 2"/>
+          <p:cNvSpPr txBox="1"/>
+          <p:nvPr/>
+        </p:nvSpPr>
+        <p:spPr>
+          <a:xfrm>
+            <a:off x="504000" y="1769040"/>
+            <a:ext cx="9071640" cy="4384440"/>
+          </a:xfrm>
+          <a:prstGeom prst="rect">
+            <a:avLst/>
+          </a:prstGeom>
+          <a:noFill/>
+          <a:ln>
+            <a:noFill/>
+          </a:ln>
+        </p:spPr>
+        <p:txBody>
+          <a:bodyPr lIns="0" rIns="0" tIns="0" bIns="0">
+            <a:noAutofit/>
+          </a:bodyPr>
+          <a:p>
+            <a:pPr marL="432000" indent="-324000">
+              <a:spcBef>
+                <a:spcPts val="1417"/>
+              </a:spcBef>
+              <a:buClr>
+                <a:srgbClr val="000000"/>
+              </a:buClr>
+              <a:buSzPct val="45000"/>
+              <a:buFont typeface="Wingdings" charset="2"/>
+              <a:buChar char=""/>
+            </a:pPr>
+            <a:r>
+              <a:rPr b="0" lang="en-US" sz="3200" spc="-1" strike="noStrike">
+                <a:solidFill>
+                  <a:srgbClr val="0066cc"/>
+                </a:solidFill>
+                <a:latin typeface="Arial"/>
+              </a:rPr>
+              <a:t>Primer: (python &amp;&amp; java) || !test</a:t>
+            </a:r>
+            <a:endParaRPr b="0" lang="en-US" sz="3200" spc="-1" strike="noStrike">
+              <a:solidFill>
+                <a:srgbClr val="0066cc"/>
+              </a:solidFill>
+              <a:latin typeface="Arial"/>
+            </a:endParaRPr>
+          </a:p>
+        </p:txBody>
+      </p:sp>
+      <p:sp>
+        <p:nvSpPr>
+          <p:cNvPr id="119" name="TextShape 3"/>
+          <p:cNvSpPr txBox="1"/>
+          <p:nvPr/>
+        </p:nvSpPr>
+        <p:spPr>
+          <a:xfrm>
+            <a:off x="1097280" y="2468880"/>
+            <a:ext cx="7589520" cy="3161880"/>
+          </a:xfrm>
+          <a:prstGeom prst="rect">
+            <a:avLst/>
+          </a:prstGeom>
+          <a:noFill/>
+          <a:ln>
+            <a:noFill/>
+          </a:ln>
+        </p:spPr>
+        <p:txBody>
+          <a:bodyPr lIns="90000" rIns="90000" tIns="45000" bIns="45000">
+            <a:spAutoFit/>
+          </a:bodyPr>
+          <a:p>
+            <a:r>
+              <a:rPr b="0" lang="en-US" sz="1800" spc="-1" strike="noStrike">
+                <a:latin typeface="Arial"/>
+              </a:rPr>
+              <a:t>1. stek.push( ‘(‘ )</a:t>
+            </a:r>
+            <a:endParaRPr b="0" lang="en-US" sz="1800" spc="-1" strike="noStrike">
+              <a:latin typeface="Arial"/>
+            </a:endParaRPr>
+          </a:p>
+          <a:p>
+            <a:r>
+              <a:rPr b="0" lang="en-US" sz="1800" spc="-1" strike="noStrike">
+                <a:latin typeface="Arial"/>
+              </a:rPr>
+              <a:t>2. string = python</a:t>
+            </a:r>
+            <a:endParaRPr b="0" lang="en-US" sz="1800" spc="-1" strike="noStrike">
+              <a:latin typeface="Arial"/>
+            </a:endParaRPr>
+          </a:p>
+          <a:p>
+            <a:r>
+              <a:rPr b="0" lang="en-US" sz="1800" spc="-1" strike="noStrike">
+                <a:latin typeface="Arial"/>
+              </a:rPr>
+              <a:t>3. stek.push( ‘&amp;&amp;’ )</a:t>
+            </a:r>
+            <a:endParaRPr b="0" lang="en-US" sz="1800" spc="-1" strike="noStrike">
+              <a:latin typeface="Arial"/>
+            </a:endParaRPr>
+          </a:p>
+          <a:p>
+            <a:r>
+              <a:rPr b="0" lang="en-US" sz="1800" spc="-1" strike="noStrike">
+                <a:latin typeface="Arial"/>
+              </a:rPr>
+              <a:t>4. string = python java</a:t>
+            </a:r>
+            <a:endParaRPr b="0" lang="en-US" sz="1800" spc="-1" strike="noStrike">
+              <a:latin typeface="Arial"/>
+            </a:endParaRPr>
+          </a:p>
+          <a:p>
+            <a:r>
+              <a:rPr b="0" lang="en-US" sz="1800" spc="-1" strike="noStrike">
+                <a:latin typeface="Arial"/>
+              </a:rPr>
+              <a:t>5. naleteo sam na (:</a:t>
+            </a:r>
+            <a:endParaRPr b="0" lang="en-US" sz="1800" spc="-1" strike="noStrike">
+              <a:latin typeface="Arial"/>
+            </a:endParaRPr>
+          </a:p>
+          <a:p>
+            <a:r>
+              <a:rPr b="0" lang="en-US" sz="1800" spc="-1" strike="noStrike">
+                <a:latin typeface="Arial"/>
+              </a:rPr>
+              <a:t>6. skini sa steka &amp;&amp; – &gt; string = python java &amp;&amp;</a:t>
+            </a:r>
+            <a:endParaRPr b="0" lang="en-US" sz="1800" spc="-1" strike="noStrike">
+              <a:latin typeface="Arial"/>
+            </a:endParaRPr>
+          </a:p>
+          <a:p>
+            <a:r>
+              <a:rPr b="0" lang="en-US" sz="1800" spc="-1" strike="noStrike">
+                <a:latin typeface="Arial"/>
+              </a:rPr>
+              <a:t>7. stek.push(||)</a:t>
+            </a:r>
+            <a:endParaRPr b="0" lang="en-US" sz="1800" spc="-1" strike="noStrike">
+              <a:latin typeface="Arial"/>
+            </a:endParaRPr>
+          </a:p>
+          <a:p>
+            <a:r>
+              <a:rPr b="0" lang="en-US" sz="1800" spc="-1" strike="noStrike">
+                <a:latin typeface="Arial"/>
+              </a:rPr>
+              <a:t>8. stek.push(!)</a:t>
+            </a:r>
+            <a:endParaRPr b="0" lang="en-US" sz="1800" spc="-1" strike="noStrike">
+              <a:latin typeface="Arial"/>
+            </a:endParaRPr>
+          </a:p>
+          <a:p>
+            <a:r>
+              <a:rPr b="0" lang="en-US" sz="1800" spc="-1" strike="noStrike">
+                <a:latin typeface="Arial"/>
+              </a:rPr>
+              <a:t>9. string = python java &amp;&amp; test</a:t>
+            </a:r>
+            <a:endParaRPr b="0" lang="en-US" sz="1800" spc="-1" strike="noStrike">
+              <a:latin typeface="Arial"/>
+            </a:endParaRPr>
+          </a:p>
+          <a:p>
+            <a:r>
+              <a:rPr b="0" lang="en-US" sz="1800" spc="-1" strike="noStrike">
+                <a:latin typeface="Arial"/>
+              </a:rPr>
+              <a:t>10. stek.pop() – &gt; string = python java &amp;&amp; test !</a:t>
+            </a:r>
+            <a:endParaRPr b="0" lang="en-US" sz="1800" spc="-1" strike="noStrike">
+              <a:latin typeface="Arial"/>
+            </a:endParaRPr>
+          </a:p>
+          <a:p>
+            <a:r>
+              <a:rPr b="0" lang="en-US" sz="1800" spc="-1" strike="noStrike">
+                <a:latin typeface="Arial"/>
+              </a:rPr>
+              <a:t>11. stek.pop() – &gt; string = python java &amp;&amp; test ! ||</a:t>
+            </a:r>
+            <a:endParaRPr b="0" lang="en-US" sz="1800" spc="-1" strike="noStrike">
+              <a:latin typeface="Arial"/>
+            </a:endParaRPr>
+          </a:p>
+          <a:p>
+            <a:endParaRPr b="0" lang="en-US" sz="1800" spc="-1" strike="noStrike">
+              <a:latin typeface="Arial"/>
+            </a:endParaRPr>
+          </a:p>
+        </p:txBody>
+      </p:sp>
+    </p:spTree>
+  </p:cSld>
+  <mc:AlternateContent>
+    <mc:Choice Requires="p14">
+      <p:transition spd="slow" p14:dur="2000"/>
+    </mc:Choice>
+    <mc:Fallback>
+      <p:transition spd="slow"/>
+    </mc:Fallback>
+  </mc:AlternateContent>
+</p:sld>
+</file>
+
+<file path=ppt/slides/slide15.xml><?xml version="1.0" encoding="utf-8"?>
+<p:sld xmlns:a="http://schemas.openxmlformats.org/drawingml/2006/main" xmlns:p="http://schemas.openxmlformats.org/presentationml/2006/main" xmlns:r="http://schemas.openxmlformats.org/officeDocument/2006/relationships" xmlns:p14="http://schemas.microsoft.com/office/powerpoint/2010/main" xmlns:p15="http://schemas.microsoft.com/office/powerpoint/2012/main" xmlns:mc="http://schemas.openxmlformats.org/markup-compatibility/2006">
+  <p:cSld>
+    <p:spTree>
+      <p:nvGrpSpPr>
+        <p:cNvPr id="1" name=""/>
+        <p:cNvGrpSpPr/>
+        <p:nvPr/>
+      </p:nvGrpSpPr>
+      <p:grpSpPr>
+        <a:xfrm>
+          <a:off x="0" y="0"/>
+          <a:ext cx="0" cy="0"/>
+          <a:chOff x="0" y="0"/>
+          <a:chExt cx="0" cy="0"/>
+        </a:xfrm>
+      </p:grpSpPr>
+      <p:sp>
+        <p:nvSpPr>
+          <p:cNvPr id="120" name="TextShape 1"/>
+          <p:cNvSpPr txBox="1"/>
+          <p:nvPr/>
+        </p:nvSpPr>
+        <p:spPr>
+          <a:xfrm>
+            <a:off x="504000" y="301320"/>
+            <a:ext cx="9071640" cy="637560"/>
+          </a:xfrm>
+          <a:prstGeom prst="rect">
+            <a:avLst/>
+          </a:prstGeom>
+          <a:noFill/>
+          <a:ln>
+            <a:noFill/>
+          </a:ln>
+        </p:spPr>
+        <p:txBody>
+          <a:bodyPr lIns="0" rIns="0" tIns="0" bIns="0" anchor="ctr">
+            <a:spAutoFit/>
+          </a:bodyPr>
+          <a:p>
+            <a:pPr algn="ctr"/>
+            <a:r>
+              <a:rPr b="0" lang="en-US" sz="4400" spc="-1" strike="noStrike">
+                <a:solidFill>
+                  <a:srgbClr val="ffffff"/>
+                </a:solidFill>
+                <a:latin typeface="Arial"/>
+              </a:rPr>
+              <a:t>Napredna pretraga</a:t>
+            </a:r>
+            <a:endParaRPr b="0" lang="en-US" sz="4400" spc="-1" strike="noStrike">
+              <a:solidFill>
+                <a:srgbClr val="ffffff"/>
+              </a:solidFill>
+              <a:latin typeface="Arial"/>
+            </a:endParaRPr>
+          </a:p>
+        </p:txBody>
+      </p:sp>
+      <p:sp>
+        <p:nvSpPr>
+          <p:cNvPr id="121" name="CustomShape 2"/>
+          <p:cNvSpPr/>
+          <p:nvPr/>
+        </p:nvSpPr>
+        <p:spPr>
+          <a:xfrm>
+            <a:off x="640080" y="4206240"/>
+            <a:ext cx="1463040" cy="822960"/>
+          </a:xfrm>
+          <a:prstGeom prst="ellipse">
+            <a:avLst/>
+          </a:prstGeom>
+          <a:solidFill>
+            <a:srgbClr val="729fcf"/>
+          </a:solidFill>
+          <a:ln>
+            <a:solidFill>
+              <a:srgbClr val="3465a4"/>
+            </a:solidFill>
+          </a:ln>
+        </p:spPr>
+        <p:style>
+          <a:lnRef idx="0"/>
+          <a:fillRef idx="0"/>
+          <a:effectRef idx="0"/>
+          <a:fontRef idx="minor"/>
+        </p:style>
+        <p:txBody>
+          <a:bodyPr wrap="none" lIns="90000" rIns="90000" tIns="45000" bIns="45000" anchor="ctr">
+            <a:noAutofit/>
+          </a:bodyPr>
+          <a:p>
+            <a:pPr algn="ctr"/>
+            <a:r>
+              <a:rPr b="0" lang="en-US" sz="1800" spc="-1" strike="noStrike">
+                <a:latin typeface="Arial"/>
+              </a:rPr>
+              <a:t>Python</a:t>
+            </a:r>
+            <a:endParaRPr b="0" lang="en-US" sz="1800" spc="-1" strike="noStrike">
+              <a:latin typeface="Arial"/>
+            </a:endParaRPr>
+          </a:p>
+        </p:txBody>
+      </p:sp>
+      <p:sp>
+        <p:nvSpPr>
+          <p:cNvPr id="122" name="CustomShape 3"/>
+          <p:cNvSpPr/>
+          <p:nvPr/>
+        </p:nvSpPr>
+        <p:spPr>
+          <a:xfrm>
+            <a:off x="2819160" y="4269960"/>
+            <a:ext cx="1554480" cy="731520"/>
+          </a:xfrm>
+          <a:prstGeom prst="ellipse">
+            <a:avLst/>
+          </a:prstGeom>
+          <a:solidFill>
+            <a:srgbClr val="729fcf"/>
+          </a:solidFill>
+          <a:ln>
+            <a:solidFill>
+              <a:srgbClr val="3465a4"/>
+            </a:solidFill>
+          </a:ln>
+        </p:spPr>
+        <p:style>
+          <a:lnRef idx="0"/>
+          <a:fillRef idx="0"/>
+          <a:effectRef idx="0"/>
+          <a:fontRef idx="minor"/>
+        </p:style>
+        <p:txBody>
+          <a:bodyPr wrap="none" lIns="90000" rIns="90000" tIns="45000" bIns="45000" anchor="ctr">
+            <a:noAutofit/>
+          </a:bodyPr>
+          <a:p>
+            <a:pPr algn="ctr"/>
+            <a:r>
+              <a:rPr b="0" lang="en-US" sz="1800" spc="-1" strike="noStrike">
+                <a:latin typeface="Arial"/>
+              </a:rPr>
+              <a:t>Java</a:t>
+            </a:r>
+            <a:endParaRPr b="0" lang="en-US" sz="1800" spc="-1" strike="noStrike">
+              <a:latin typeface="Arial"/>
+            </a:endParaRPr>
+          </a:p>
+        </p:txBody>
+      </p:sp>
+      <p:sp>
+        <p:nvSpPr>
+          <p:cNvPr id="123" name="Line 4"/>
+          <p:cNvSpPr/>
+          <p:nvPr/>
+        </p:nvSpPr>
+        <p:spPr>
+          <a:xfrm flipV="1">
+            <a:off x="1188720" y="3474720"/>
+            <a:ext cx="640080" cy="640080"/>
+          </a:xfrm>
+          <a:prstGeom prst="line">
+            <a:avLst/>
+          </a:prstGeom>
+          <a:ln>
+            <a:solidFill>
+              <a:srgbClr val="000000"/>
+            </a:solidFill>
+          </a:ln>
+        </p:spPr>
+        <p:style>
+          <a:lnRef idx="0"/>
+          <a:fillRef idx="0"/>
+          <a:effectRef idx="0"/>
+          <a:fontRef idx="minor"/>
+        </p:style>
+      </p:sp>
+      <p:sp>
+        <p:nvSpPr>
+          <p:cNvPr id="124" name="CustomShape 5"/>
+          <p:cNvSpPr/>
+          <p:nvPr/>
+        </p:nvSpPr>
+        <p:spPr>
+          <a:xfrm>
+            <a:off x="1920240" y="2926080"/>
+            <a:ext cx="1371600" cy="640080"/>
+          </a:xfrm>
+          <a:prstGeom prst="ellipse">
+            <a:avLst/>
+          </a:prstGeom>
+          <a:solidFill>
+            <a:srgbClr val="729fcf"/>
+          </a:solidFill>
+          <a:ln>
+            <a:solidFill>
+              <a:srgbClr val="3465a4"/>
+            </a:solidFill>
+          </a:ln>
+        </p:spPr>
+        <p:style>
+          <a:lnRef idx="0"/>
+          <a:fillRef idx="0"/>
+          <a:effectRef idx="0"/>
+          <a:fontRef idx="minor"/>
+        </p:style>
+        <p:txBody>
+          <a:bodyPr wrap="none" lIns="90000" rIns="90000" tIns="45000" bIns="45000" anchor="ctr">
+            <a:noAutofit/>
+          </a:bodyPr>
+          <a:p>
+            <a:pPr algn="ctr"/>
+            <a:r>
+              <a:rPr b="0" lang="en-US" sz="1800" spc="-1" strike="noStrike">
+                <a:latin typeface="Arial"/>
+              </a:rPr>
+              <a:t>&amp;&amp;</a:t>
+            </a:r>
+            <a:endParaRPr b="0" lang="en-US" sz="1800" spc="-1" strike="noStrike">
+              <a:latin typeface="Arial"/>
+            </a:endParaRPr>
+          </a:p>
+        </p:txBody>
+      </p:sp>
+      <p:sp>
+        <p:nvSpPr>
+          <p:cNvPr id="125" name="Line 6"/>
+          <p:cNvSpPr/>
+          <p:nvPr/>
+        </p:nvSpPr>
+        <p:spPr>
+          <a:xfrm>
+            <a:off x="3200400" y="3566160"/>
+            <a:ext cx="365760" cy="548640"/>
+          </a:xfrm>
+          <a:prstGeom prst="line">
+            <a:avLst/>
+          </a:prstGeom>
+          <a:ln>
+            <a:solidFill>
+              <a:srgbClr val="000000"/>
+            </a:solidFill>
+          </a:ln>
+        </p:spPr>
+        <p:style>
+          <a:lnRef idx="0"/>
+          <a:fillRef idx="0"/>
+          <a:effectRef idx="0"/>
+          <a:fontRef idx="minor"/>
+        </p:style>
+      </p:sp>
+      <p:sp>
+        <p:nvSpPr>
+          <p:cNvPr id="126" name="CustomShape 7"/>
+          <p:cNvSpPr/>
+          <p:nvPr/>
+        </p:nvSpPr>
+        <p:spPr>
+          <a:xfrm>
+            <a:off x="3474720" y="1371600"/>
+            <a:ext cx="1554480" cy="914400"/>
+          </a:xfrm>
+          <a:prstGeom prst="ellipse">
+            <a:avLst/>
+          </a:prstGeom>
+          <a:solidFill>
+            <a:srgbClr val="729fcf"/>
+          </a:solidFill>
+          <a:ln>
+            <a:solidFill>
+              <a:srgbClr val="3465a4"/>
+            </a:solidFill>
+          </a:ln>
+        </p:spPr>
+        <p:style>
+          <a:lnRef idx="0"/>
+          <a:fillRef idx="0"/>
+          <a:effectRef idx="0"/>
+          <a:fontRef idx="minor"/>
+        </p:style>
+        <p:txBody>
+          <a:bodyPr wrap="none" lIns="90000" rIns="90000" tIns="45000" bIns="45000" anchor="ctr">
+            <a:noAutofit/>
+          </a:bodyPr>
+          <a:p>
+            <a:pPr algn="ctr"/>
+            <a:r>
+              <a:rPr b="0" lang="en-US" sz="1800" spc="-1" strike="noStrike">
+                <a:latin typeface="Arial"/>
+              </a:rPr>
+              <a:t>||</a:t>
+            </a:r>
+            <a:endParaRPr b="0" lang="en-US" sz="1800" spc="-1" strike="noStrike">
+              <a:latin typeface="Arial"/>
+            </a:endParaRPr>
+          </a:p>
+        </p:txBody>
+      </p:sp>
+      <p:sp>
+        <p:nvSpPr>
+          <p:cNvPr id="127" name="Line 8"/>
+          <p:cNvSpPr/>
+          <p:nvPr/>
+        </p:nvSpPr>
+        <p:spPr>
+          <a:xfrm flipV="1">
+            <a:off x="2926080" y="2194560"/>
+            <a:ext cx="548640" cy="548640"/>
+          </a:xfrm>
+          <a:prstGeom prst="line">
+            <a:avLst/>
+          </a:prstGeom>
+          <a:ln>
+            <a:solidFill>
+              <a:srgbClr val="000000"/>
+            </a:solidFill>
+          </a:ln>
+        </p:spPr>
+        <p:style>
+          <a:lnRef idx="0"/>
+          <a:fillRef idx="0"/>
+          <a:effectRef idx="0"/>
+          <a:fontRef idx="minor"/>
+        </p:style>
+      </p:sp>
+      <p:sp>
+        <p:nvSpPr>
+          <p:cNvPr id="128" name="Line 9"/>
+          <p:cNvSpPr/>
+          <p:nvPr/>
+        </p:nvSpPr>
+        <p:spPr>
+          <a:xfrm>
+            <a:off x="5120640" y="2011680"/>
+            <a:ext cx="640080" cy="640080"/>
+          </a:xfrm>
+          <a:prstGeom prst="line">
+            <a:avLst/>
+          </a:prstGeom>
+          <a:ln>
+            <a:solidFill>
+              <a:srgbClr val="000000"/>
+            </a:solidFill>
+          </a:ln>
+        </p:spPr>
+        <p:style>
+          <a:lnRef idx="0"/>
+          <a:fillRef idx="0"/>
+          <a:effectRef idx="0"/>
+          <a:fontRef idx="minor"/>
+        </p:style>
+      </p:sp>
+      <p:sp>
+        <p:nvSpPr>
+          <p:cNvPr id="129" name="CustomShape 10"/>
+          <p:cNvSpPr/>
+          <p:nvPr/>
+        </p:nvSpPr>
+        <p:spPr>
+          <a:xfrm>
+            <a:off x="5669280" y="2743200"/>
+            <a:ext cx="1371600" cy="731520"/>
+          </a:xfrm>
+          <a:prstGeom prst="ellipse">
+            <a:avLst/>
+          </a:prstGeom>
+          <a:solidFill>
+            <a:srgbClr val="729fcf"/>
+          </a:solidFill>
+          <a:ln>
+            <a:solidFill>
+              <a:srgbClr val="3465a4"/>
+            </a:solidFill>
+          </a:ln>
+        </p:spPr>
+        <p:style>
+          <a:lnRef idx="0"/>
+          <a:fillRef idx="0"/>
+          <a:effectRef idx="0"/>
+          <a:fontRef idx="minor"/>
+        </p:style>
+        <p:txBody>
+          <a:bodyPr wrap="none" lIns="90000" rIns="90000" tIns="45000" bIns="45000" anchor="ctr">
+            <a:noAutofit/>
+          </a:bodyPr>
+          <a:p>
+            <a:pPr algn="ctr"/>
+            <a:r>
+              <a:rPr b="0" lang="en-US" sz="1800" spc="-1" strike="noStrike">
+                <a:latin typeface="Arial"/>
+              </a:rPr>
+              <a:t>!</a:t>
+            </a:r>
+            <a:endParaRPr b="0" lang="en-US" sz="1800" spc="-1" strike="noStrike">
+              <a:latin typeface="Arial"/>
+            </a:endParaRPr>
+          </a:p>
+        </p:txBody>
+      </p:sp>
+      <p:sp>
+        <p:nvSpPr>
+          <p:cNvPr id="130" name="Line 11"/>
+          <p:cNvSpPr/>
+          <p:nvPr/>
+        </p:nvSpPr>
+        <p:spPr>
+          <a:xfrm flipH="1">
+            <a:off x="5760720" y="3566160"/>
+            <a:ext cx="457200" cy="548640"/>
+          </a:xfrm>
+          <a:prstGeom prst="line">
+            <a:avLst/>
+          </a:prstGeom>
+          <a:ln>
+            <a:solidFill>
+              <a:srgbClr val="000000"/>
+            </a:solidFill>
+          </a:ln>
+        </p:spPr>
+        <p:style>
+          <a:lnRef idx="0"/>
+          <a:fillRef idx="0"/>
+          <a:effectRef idx="0"/>
+          <a:fontRef idx="minor"/>
+        </p:style>
+      </p:sp>
+      <p:sp>
+        <p:nvSpPr>
+          <p:cNvPr id="131" name="CustomShape 12"/>
+          <p:cNvSpPr/>
+          <p:nvPr/>
+        </p:nvSpPr>
+        <p:spPr>
+          <a:xfrm>
+            <a:off x="4846320" y="4206240"/>
+            <a:ext cx="1463040" cy="731520"/>
+          </a:xfrm>
+          <a:prstGeom prst="ellipse">
+            <a:avLst/>
+          </a:prstGeom>
+          <a:solidFill>
+            <a:srgbClr val="729fcf"/>
+          </a:solidFill>
+          <a:ln>
+            <a:solidFill>
+              <a:srgbClr val="3465a4"/>
+            </a:solidFill>
+          </a:ln>
+        </p:spPr>
+        <p:style>
+          <a:lnRef idx="0"/>
+          <a:fillRef idx="0"/>
+          <a:effectRef idx="0"/>
+          <a:fontRef idx="minor"/>
+        </p:style>
+        <p:txBody>
+          <a:bodyPr wrap="none" lIns="90000" rIns="90000" tIns="45000" bIns="45000" anchor="ctr">
+            <a:noAutofit/>
+          </a:bodyPr>
+          <a:p>
+            <a:pPr algn="ctr"/>
+            <a:r>
+              <a:rPr b="0" lang="en-US" sz="1800" spc="-1" strike="noStrike">
+                <a:latin typeface="Arial"/>
+              </a:rPr>
+              <a:t>Test </a:t>
+            </a:r>
+            <a:endParaRPr b="0" lang="en-US" sz="1800" spc="-1" strike="noStrike">
+              <a:latin typeface="Arial"/>
+            </a:endParaRPr>
+          </a:p>
+        </p:txBody>
+      </p:sp>
+      <p:sp>
+        <p:nvSpPr>
+          <p:cNvPr id="132" name="TextShape 13"/>
+          <p:cNvSpPr txBox="1"/>
+          <p:nvPr/>
+        </p:nvSpPr>
+        <p:spPr>
+          <a:xfrm>
+            <a:off x="6309360" y="5577840"/>
+            <a:ext cx="5486400" cy="602280"/>
+          </a:xfrm>
+          <a:prstGeom prst="rect">
+            <a:avLst/>
+          </a:prstGeom>
+          <a:noFill/>
+          <a:ln>
+            <a:noFill/>
+          </a:ln>
+        </p:spPr>
+        <p:txBody>
+          <a:bodyPr lIns="90000" rIns="90000" tIns="45000" bIns="45000">
+            <a:spAutoFit/>
+          </a:bodyPr>
+          <a:p>
+            <a:r>
+              <a:rPr b="0" lang="en-US" sz="1800" spc="-1" strike="noStrike">
+                <a:latin typeface="Arial"/>
+              </a:rPr>
+              <a:t>python &amp;&amp; java || !test</a:t>
+            </a:r>
+            <a:endParaRPr b="0" lang="en-US" sz="1800" spc="-1" strike="noStrike">
+              <a:latin typeface="Arial"/>
+            </a:endParaRPr>
+          </a:p>
+          <a:p>
+            <a:r>
+              <a:rPr b="0" lang="en-US" sz="1800" spc="-1" strike="noStrike">
+                <a:latin typeface="Arial"/>
+              </a:rPr>
+              <a:t>python java &amp;&amp; test ! ||</a:t>
+            </a:r>
+            <a:endParaRPr b="0" lang="en-US" sz="1800" spc="-1" strike="noStrike">
+              <a:latin typeface="Arial"/>
+            </a:endParaRPr>
+          </a:p>
+        </p:txBody>
+      </p:sp>
+    </p:spTree>
+  </p:cSld>
+  <mc:AlternateContent>
+    <mc:Choice Requires="p14">
+      <p:transition spd="slow" p14:dur="2000"/>
+    </mc:Choice>
+    <mc:Fallback>
+      <p:transition spd="slow"/>
+    </mc:Fallback>
+  </mc:AlternateContent>
+</p:sld>
+</file>
+
+<file path=ppt/slides/slide16.xml><?xml version="1.0" encoding="utf-8"?>
+<p:sld xmlns:a="http://schemas.openxmlformats.org/drawingml/2006/main" xmlns:p="http://schemas.openxmlformats.org/presentationml/2006/main" xmlns:r="http://schemas.openxmlformats.org/officeDocument/2006/relationships" xmlns:p14="http://schemas.microsoft.com/office/powerpoint/2010/main" xmlns:p15="http://schemas.microsoft.com/office/powerpoint/2012/main" xmlns:mc="http://schemas.openxmlformats.org/markup-compatibility/2006">
+  <p:cSld>
+    <p:spTree>
+      <p:nvGrpSpPr>
+        <p:cNvPr id="1" name=""/>
+        <p:cNvGrpSpPr/>
+        <p:nvPr/>
+      </p:nvGrpSpPr>
+      <p:grpSpPr>
+        <a:xfrm>
+          <a:off x="0" y="0"/>
+          <a:ext cx="0" cy="0"/>
+          <a:chOff x="0" y="0"/>
+          <a:chExt cx="0" cy="0"/>
+        </a:xfrm>
+      </p:grpSpPr>
+      <p:sp>
+        <p:nvSpPr>
+          <p:cNvPr id="133" name="TextShape 1"/>
+          <p:cNvSpPr txBox="1"/>
+          <p:nvPr/>
+        </p:nvSpPr>
+        <p:spPr>
+          <a:xfrm>
+            <a:off x="504000" y="301320"/>
+            <a:ext cx="9071640" cy="637560"/>
+          </a:xfrm>
+          <a:prstGeom prst="rect">
+            <a:avLst/>
+          </a:prstGeom>
+          <a:noFill/>
+          <a:ln>
+            <a:noFill/>
+          </a:ln>
+        </p:spPr>
+        <p:txBody>
+          <a:bodyPr lIns="0" rIns="0" tIns="0" bIns="0" anchor="ctr">
+            <a:spAutoFit/>
+          </a:bodyPr>
+          <a:p>
+            <a:pPr algn="ctr"/>
+            <a:r>
+              <a:rPr b="0" lang="en-US" sz="4400" spc="-1" strike="noStrike">
+                <a:solidFill>
+                  <a:srgbClr val="ffffff"/>
+                </a:solidFill>
+                <a:latin typeface="Arial"/>
+              </a:rPr>
+              <a:t>Napredna pretraga</a:t>
+            </a:r>
+            <a:endParaRPr b="0" lang="en-US" sz="4400" spc="-1" strike="noStrike">
+              <a:solidFill>
+                <a:srgbClr val="ffffff"/>
+              </a:solidFill>
+              <a:latin typeface="Arial"/>
+            </a:endParaRPr>
+          </a:p>
+        </p:txBody>
+      </p:sp>
+      <p:sp>
+        <p:nvSpPr>
+          <p:cNvPr id="134" name="TextShape 2"/>
+          <p:cNvSpPr txBox="1"/>
+          <p:nvPr/>
+        </p:nvSpPr>
+        <p:spPr>
+          <a:xfrm>
+            <a:off x="504000" y="1769040"/>
+            <a:ext cx="9071640" cy="4384440"/>
+          </a:xfrm>
+          <a:prstGeom prst="rect">
+            <a:avLst/>
+          </a:prstGeom>
+          <a:noFill/>
+          <a:ln>
+            <a:noFill/>
+          </a:ln>
+        </p:spPr>
+        <p:txBody>
+          <a:bodyPr lIns="0" rIns="0" tIns="0" bIns="0">
+            <a:noAutofit/>
+          </a:bodyPr>
+          <a:p>
+            <a:pPr marL="432000" indent="-324000">
+              <a:spcBef>
+                <a:spcPts val="1417"/>
+              </a:spcBef>
+              <a:buClr>
+                <a:srgbClr val="000000"/>
+              </a:buClr>
+              <a:buSzPct val="45000"/>
+              <a:buFont typeface="Wingdings" charset="2"/>
+              <a:buChar char=""/>
+            </a:pPr>
+            <a:r>
+              <a:rPr b="0" lang="en-US" sz="3200" spc="-1" strike="noStrike">
+                <a:solidFill>
+                  <a:srgbClr val="0066cc"/>
+                </a:solidFill>
+                <a:latin typeface="Arial"/>
+              </a:rPr>
+              <a:t>Stablo je binarno. Algoritam stvaranja je sledeci:</a:t>
+            </a:r>
+            <a:endParaRPr b="0" lang="en-US" sz="3200" spc="-1" strike="noStrike">
+              <a:solidFill>
+                <a:srgbClr val="0066cc"/>
+              </a:solidFill>
+              <a:latin typeface="Arial"/>
+            </a:endParaRPr>
+          </a:p>
+          <a:p>
+            <a:pPr lvl="1" marL="864000" indent="-324000">
+              <a:spcBef>
+                <a:spcPts val="1134"/>
+              </a:spcBef>
+              <a:buClr>
+                <a:srgbClr val="000000"/>
+              </a:buClr>
+              <a:buSzPct val="75000"/>
+              <a:buFont typeface="Symbol" charset="2"/>
+              <a:buChar char=""/>
+            </a:pPr>
+            <a:r>
+              <a:rPr b="0" lang="en-US" sz="2800" spc="-1" strike="noStrike">
+                <a:solidFill>
+                  <a:srgbClr val="0066cc"/>
+                </a:solidFill>
+                <a:latin typeface="Arial"/>
+              </a:rPr>
+              <a:t>Za svaku rec kreiraj cvor I stavi na stek.</a:t>
+            </a:r>
+            <a:endParaRPr b="0" lang="en-US" sz="2800" spc="-1" strike="noStrike">
+              <a:solidFill>
+                <a:srgbClr val="0066cc"/>
+              </a:solidFill>
+              <a:latin typeface="Arial"/>
+            </a:endParaRPr>
+          </a:p>
+          <a:p>
+            <a:pPr lvl="1" marL="864000" indent="-324000">
+              <a:spcBef>
+                <a:spcPts val="1134"/>
+              </a:spcBef>
+              <a:buClr>
+                <a:srgbClr val="000000"/>
+              </a:buClr>
+              <a:buSzPct val="75000"/>
+              <a:buFont typeface="Symbol" charset="2"/>
+              <a:buChar char=""/>
+            </a:pPr>
+            <a:r>
+              <a:rPr b="0" lang="en-US" sz="2800" spc="-1" strike="noStrike">
+                <a:solidFill>
+                  <a:srgbClr val="0066cc"/>
+                </a:solidFill>
+                <a:latin typeface="Arial"/>
+              </a:rPr>
+              <a:t>Kad je operator koji nije unaran (&amp;&amp; ili ||)</a:t>
+            </a:r>
+            <a:endParaRPr b="0" lang="en-US" sz="2800" spc="-1" strike="noStrike">
+              <a:solidFill>
+                <a:srgbClr val="0066cc"/>
+              </a:solidFill>
+              <a:latin typeface="Arial"/>
+            </a:endParaRPr>
+          </a:p>
+          <a:p>
+            <a:pPr lvl="2" marL="1296000" indent="-288000">
+              <a:spcBef>
+                <a:spcPts val="850"/>
+              </a:spcBef>
+              <a:buClr>
+                <a:srgbClr val="000000"/>
+              </a:buClr>
+              <a:buSzPct val="45000"/>
+              <a:buFont typeface="Wingdings" charset="2"/>
+              <a:buChar char=""/>
+            </a:pPr>
+            <a:r>
+              <a:rPr b="0" lang="en-US" sz="2400" spc="-1" strike="noStrike">
+                <a:solidFill>
+                  <a:srgbClr val="0066cc"/>
+                </a:solidFill>
+                <a:latin typeface="Arial"/>
+              </a:rPr>
+              <a:t>Skini sa steka dva elementa I stavi kao levo I desno dete posle kreiranja cvora sa operatorom I smesti sve to na stek.</a:t>
+            </a:r>
+            <a:endParaRPr b="0" lang="en-US" sz="2400" spc="-1" strike="noStrike">
+              <a:solidFill>
+                <a:srgbClr val="0066cc"/>
+              </a:solidFill>
+              <a:latin typeface="Arial"/>
+            </a:endParaRPr>
+          </a:p>
+          <a:p>
+            <a:pPr lvl="2" marL="1296000" indent="-288000">
+              <a:spcBef>
+                <a:spcPts val="850"/>
+              </a:spcBef>
+              <a:buClr>
+                <a:srgbClr val="000000"/>
+              </a:buClr>
+              <a:buSzPct val="45000"/>
+              <a:buFont typeface="Wingdings" charset="2"/>
+              <a:buChar char=""/>
+            </a:pPr>
+            <a:endParaRPr b="0" lang="en-US" sz="2400" spc="-1" strike="noStrike">
+              <a:solidFill>
+                <a:srgbClr val="0066cc"/>
+              </a:solidFill>
+              <a:latin typeface="Arial"/>
+            </a:endParaRPr>
+          </a:p>
+        </p:txBody>
+      </p:sp>
+    </p:spTree>
+  </p:cSld>
+  <mc:AlternateContent>
+    <mc:Choice Requires="p14">
+      <p:transition spd="slow" p14:dur="2000"/>
+    </mc:Choice>
+    <mc:Fallback>
+      <p:transition spd="slow"/>
+    </mc:Fallback>
+  </mc:AlternateContent>
+</p:sld>
+</file>
+
+<file path=ppt/slides/slide17.xml><?xml version="1.0" encoding="utf-8"?>
+<p:sld xmlns:a="http://schemas.openxmlformats.org/drawingml/2006/main" xmlns:p="http://schemas.openxmlformats.org/presentationml/2006/main" xmlns:r="http://schemas.openxmlformats.org/officeDocument/2006/relationships" xmlns:p14="http://schemas.microsoft.com/office/powerpoint/2010/main" xmlns:p15="http://schemas.microsoft.com/office/powerpoint/2012/main" xmlns:mc="http://schemas.openxmlformats.org/markup-compatibility/2006">
+  <p:cSld>
+    <p:spTree>
+      <p:nvGrpSpPr>
+        <p:cNvPr id="1" name=""/>
+        <p:cNvGrpSpPr/>
+        <p:nvPr/>
+      </p:nvGrpSpPr>
+      <p:grpSpPr>
+        <a:xfrm>
+          <a:off x="0" y="0"/>
+          <a:ext cx="0" cy="0"/>
+          <a:chOff x="0" y="0"/>
+          <a:chExt cx="0" cy="0"/>
+        </a:xfrm>
+      </p:grpSpPr>
+      <p:sp>
+        <p:nvSpPr>
+          <p:cNvPr id="135" name="TextShape 1"/>
+          <p:cNvSpPr txBox="1"/>
+          <p:nvPr/>
+        </p:nvSpPr>
+        <p:spPr>
+          <a:xfrm>
+            <a:off x="504000" y="301320"/>
+            <a:ext cx="9071640" cy="637560"/>
+          </a:xfrm>
+          <a:prstGeom prst="rect">
+            <a:avLst/>
+          </a:prstGeom>
+          <a:noFill/>
+          <a:ln>
+            <a:noFill/>
+          </a:ln>
+        </p:spPr>
+        <p:txBody>
+          <a:bodyPr lIns="0" rIns="0" tIns="0" bIns="0" anchor="ctr">
+            <a:spAutoFit/>
+          </a:bodyPr>
+          <a:p>
+            <a:pPr algn="ctr"/>
+            <a:r>
+              <a:rPr b="0" lang="en-US" sz="4400" spc="-1" strike="noStrike">
+                <a:solidFill>
+                  <a:srgbClr val="ffffff"/>
+                </a:solidFill>
+                <a:latin typeface="Arial"/>
+              </a:rPr>
+              <a:t>Napredna pretraga</a:t>
+            </a:r>
+            <a:endParaRPr b="0" lang="en-US" sz="4400" spc="-1" strike="noStrike">
+              <a:solidFill>
+                <a:srgbClr val="ffffff"/>
+              </a:solidFill>
+              <a:latin typeface="Arial"/>
+            </a:endParaRPr>
+          </a:p>
+        </p:txBody>
+      </p:sp>
+      <p:sp>
+        <p:nvSpPr>
+          <p:cNvPr id="136" name="TextShape 2"/>
+          <p:cNvSpPr txBox="1"/>
+          <p:nvPr/>
+        </p:nvSpPr>
+        <p:spPr>
+          <a:xfrm>
+            <a:off x="504000" y="1769040"/>
+            <a:ext cx="9071640" cy="4384440"/>
+          </a:xfrm>
+          <a:prstGeom prst="rect">
+            <a:avLst/>
+          </a:prstGeom>
+          <a:noFill/>
+          <a:ln>
+            <a:noFill/>
+          </a:ln>
+        </p:spPr>
+        <p:txBody>
+          <a:bodyPr lIns="0" rIns="0" tIns="0" bIns="0">
+            <a:noAutofit/>
+          </a:bodyPr>
+          <a:p>
+            <a:pPr marL="432000" indent="-324000">
+              <a:spcBef>
+                <a:spcPts val="1417"/>
+              </a:spcBef>
+              <a:buClr>
+                <a:srgbClr val="000000"/>
+              </a:buClr>
+              <a:buSzPct val="45000"/>
+              <a:buFont typeface="Wingdings" charset="2"/>
+              <a:buChar char=""/>
+            </a:pPr>
+            <a:r>
+              <a:rPr b="0" lang="en-US" sz="3200" spc="-1" strike="noStrike">
+                <a:solidFill>
+                  <a:srgbClr val="0066cc"/>
+                </a:solidFill>
+                <a:latin typeface="Arial"/>
+              </a:rPr>
+              <a:t>Kada je unaran operator ‘!’ </a:t>
+            </a:r>
+            <a:endParaRPr b="0" lang="en-US" sz="3200" spc="-1" strike="noStrike">
+              <a:solidFill>
+                <a:srgbClr val="0066cc"/>
+              </a:solidFill>
+              <a:latin typeface="Arial"/>
+            </a:endParaRPr>
+          </a:p>
+          <a:p>
+            <a:pPr lvl="1" marL="864000" indent="-324000">
+              <a:spcBef>
+                <a:spcPts val="1134"/>
+              </a:spcBef>
+              <a:buClr>
+                <a:srgbClr val="000000"/>
+              </a:buClr>
+              <a:buSzPct val="75000"/>
+              <a:buFont typeface="Symbol" charset="2"/>
+              <a:buChar char=""/>
+            </a:pPr>
+            <a:r>
+              <a:rPr b="0" lang="en-US" sz="2800" spc="-1" strike="noStrike">
+                <a:solidFill>
+                  <a:srgbClr val="0066cc"/>
+                </a:solidFill>
+                <a:latin typeface="Arial"/>
+              </a:rPr>
+              <a:t>Skini sa steka jedan cvor I stavi ga kao levo dete kreiranog cvora sa ‘!’ I smesti sve na stek.</a:t>
+            </a:r>
+            <a:endParaRPr b="0" lang="en-US" sz="2800" spc="-1" strike="noStrike">
+              <a:solidFill>
+                <a:srgbClr val="0066cc"/>
+              </a:solidFill>
+              <a:latin typeface="Arial"/>
+            </a:endParaRPr>
+          </a:p>
+          <a:p>
+            <a:pPr lvl="1" marL="864000" indent="-324000">
+              <a:spcBef>
+                <a:spcPts val="1134"/>
+              </a:spcBef>
+              <a:buClr>
+                <a:srgbClr val="000000"/>
+              </a:buClr>
+              <a:buSzPct val="75000"/>
+              <a:buFont typeface="Symbol" charset="2"/>
+              <a:buChar char=""/>
+            </a:pPr>
+            <a:r>
+              <a:rPr b="0" lang="en-US" sz="2800" spc="-1" strike="noStrike">
+                <a:solidFill>
+                  <a:srgbClr val="0066cc"/>
+                </a:solidFill>
+                <a:latin typeface="Arial"/>
+              </a:rPr>
+              <a:t>Nakon svega toga evaluacija stabla je veoma jednostavna I realizuje se rekurzivnim pozivom funkcije za evaluacije stabla.</a:t>
+            </a:r>
+            <a:endParaRPr b="0" lang="en-US" sz="2800" spc="-1" strike="noStrike">
+              <a:solidFill>
+                <a:srgbClr val="0066cc"/>
+              </a:solidFill>
+              <a:latin typeface="Arial"/>
+            </a:endParaRPr>
+          </a:p>
+        </p:txBody>
+      </p:sp>
+    </p:spTree>
+  </p:cSld>
+  <mc:AlternateContent>
+    <mc:Choice Requires="p14">
+      <p:transition spd="slow" p14:dur="2000"/>
+    </mc:Choice>
+    <mc:Fallback>
+      <p:transition spd="slow"/>
+    </mc:Fallback>
+  </mc:AlternateContent>
+</p:sld>
+</file>
+
+<file path=ppt/slides/slide18.xml><?xml version="1.0" encoding="utf-8"?>
+<p:sld xmlns:a="http://schemas.openxmlformats.org/drawingml/2006/main" xmlns:p="http://schemas.openxmlformats.org/presentationml/2006/main" xmlns:r="http://schemas.openxmlformats.org/officeDocument/2006/relationships" xmlns:p14="http://schemas.microsoft.com/office/powerpoint/2010/main" xmlns:p15="http://schemas.microsoft.com/office/powerpoint/2012/main" xmlns:mc="http://schemas.openxmlformats.org/markup-compatibility/2006">
+  <p:cSld>
+    <p:spTree>
+      <p:nvGrpSpPr>
+        <p:cNvPr id="1" name=""/>
+        <p:cNvGrpSpPr/>
+        <p:nvPr/>
+      </p:nvGrpSpPr>
+      <p:grpSpPr>
+        <a:xfrm>
+          <a:off x="0" y="0"/>
+          <a:ext cx="0" cy="0"/>
+          <a:chOff x="0" y="0"/>
+          <a:chExt cx="0" cy="0"/>
+        </a:xfrm>
+      </p:grpSpPr>
+      <p:sp>
+        <p:nvSpPr>
+          <p:cNvPr id="137" name="TextShape 1"/>
+          <p:cNvSpPr txBox="1"/>
+          <p:nvPr/>
+        </p:nvSpPr>
+        <p:spPr>
+          <a:xfrm>
+            <a:off x="504000" y="301320"/>
+            <a:ext cx="9071640" cy="637560"/>
+          </a:xfrm>
+          <a:prstGeom prst="rect">
+            <a:avLst/>
+          </a:prstGeom>
+          <a:noFill/>
+          <a:ln>
+            <a:noFill/>
+          </a:ln>
+        </p:spPr>
+        <p:txBody>
+          <a:bodyPr lIns="0" rIns="0" tIns="0" bIns="0" anchor="ctr">
+            <a:spAutoFit/>
+          </a:bodyPr>
+          <a:p>
+            <a:pPr algn="ctr"/>
+            <a:r>
+              <a:rPr b="0" lang="en-US" sz="4400" spc="-1" strike="noStrike">
+                <a:solidFill>
+                  <a:srgbClr val="ffffff"/>
+                </a:solidFill>
+                <a:latin typeface="Arial"/>
+              </a:rPr>
+              <a:t>Napredna pretraga</a:t>
+            </a:r>
+            <a:endParaRPr b="0" lang="en-US" sz="4400" spc="-1" strike="noStrike">
+              <a:solidFill>
+                <a:srgbClr val="ffffff"/>
+              </a:solidFill>
+              <a:latin typeface="Arial"/>
+            </a:endParaRPr>
+          </a:p>
+        </p:txBody>
+      </p:sp>
+      <p:sp>
+        <p:nvSpPr>
+          <p:cNvPr id="138" name="TextShape 2"/>
+          <p:cNvSpPr txBox="1"/>
+          <p:nvPr/>
+        </p:nvSpPr>
+        <p:spPr>
+          <a:xfrm>
+            <a:off x="504000" y="1769040"/>
+            <a:ext cx="9071640" cy="4384440"/>
+          </a:xfrm>
+          <a:prstGeom prst="rect">
+            <a:avLst/>
+          </a:prstGeom>
+          <a:noFill/>
+          <a:ln>
+            <a:noFill/>
+          </a:ln>
+        </p:spPr>
+        <p:txBody>
+          <a:bodyPr lIns="0" rIns="0" tIns="0" bIns="0">
+            <a:noAutofit/>
+          </a:bodyPr>
+          <a:p>
+            <a:pPr marL="432000" indent="-324000">
+              <a:spcBef>
+                <a:spcPts val="1417"/>
+              </a:spcBef>
+              <a:buClr>
+                <a:srgbClr val="000000"/>
+              </a:buClr>
+              <a:buSzPct val="45000"/>
+              <a:buFont typeface="Wingdings" charset="2"/>
+              <a:buChar char=""/>
+            </a:pPr>
+            <a:r>
+              <a:rPr b="0" lang="en-US" sz="3200" spc="-1" strike="noStrike">
+                <a:solidFill>
+                  <a:srgbClr val="0066cc"/>
+                </a:solidFill>
+                <a:latin typeface="Arial"/>
+              </a:rPr>
+              <a:t>Evaluacija stabla:</a:t>
+            </a:r>
+            <a:endParaRPr b="0" lang="en-US" sz="3200" spc="-1" strike="noStrike">
+              <a:solidFill>
+                <a:srgbClr val="0066cc"/>
+              </a:solidFill>
+              <a:latin typeface="Arial"/>
+            </a:endParaRPr>
+          </a:p>
+          <a:p>
+            <a:pPr lvl="1" marL="864000" indent="-324000">
+              <a:spcBef>
+                <a:spcPts val="1134"/>
+              </a:spcBef>
+              <a:buClr>
+                <a:srgbClr val="000000"/>
+              </a:buClr>
+              <a:buSzPct val="75000"/>
+              <a:buFont typeface="Symbol" charset="2"/>
+              <a:buChar char=""/>
+            </a:pPr>
+            <a:r>
+              <a:rPr b="0" lang="en-US" sz="2800" spc="-1" strike="noStrike">
+                <a:solidFill>
+                  <a:srgbClr val="0066cc"/>
+                </a:solidFill>
+                <a:latin typeface="Arial"/>
+              </a:rPr>
+              <a:t>Rekurzivno pozivaj funkciju dok ne stignes do listova.</a:t>
+            </a:r>
+            <a:endParaRPr b="0" lang="en-US" sz="2800" spc="-1" strike="noStrike">
+              <a:solidFill>
+                <a:srgbClr val="0066cc"/>
+              </a:solidFill>
+              <a:latin typeface="Arial"/>
+            </a:endParaRPr>
+          </a:p>
+          <a:p>
+            <a:pPr lvl="1" marL="864000" indent="-324000">
+              <a:spcBef>
+                <a:spcPts val="1134"/>
+              </a:spcBef>
+              <a:buClr>
+                <a:srgbClr val="000000"/>
+              </a:buClr>
+              <a:buSzPct val="75000"/>
+              <a:buFont typeface="Symbol" charset="2"/>
+              <a:buChar char=""/>
+            </a:pPr>
+            <a:r>
+              <a:rPr b="0" lang="en-US" sz="2800" spc="-1" strike="noStrike">
+                <a:solidFill>
+                  <a:srgbClr val="0066cc"/>
+                </a:solidFill>
+                <a:latin typeface="Arial"/>
+              </a:rPr>
+              <a:t>Kada stignes do listova (nemaju ni levo ni desno dete) pronadji skup stranica koje sadrze datu rec. Ti listovi sadrze rec za pretragu. </a:t>
+            </a:r>
+            <a:endParaRPr b="0" lang="en-US" sz="2800" spc="-1" strike="noStrike">
+              <a:solidFill>
+                <a:srgbClr val="0066cc"/>
+              </a:solidFill>
+              <a:latin typeface="Arial"/>
+            </a:endParaRPr>
+          </a:p>
+          <a:p>
+            <a:pPr lvl="1" marL="864000" indent="-324000">
+              <a:spcBef>
+                <a:spcPts val="1134"/>
+              </a:spcBef>
+              <a:buClr>
+                <a:srgbClr val="000000"/>
+              </a:buClr>
+              <a:buSzPct val="75000"/>
+              <a:buFont typeface="Symbol" charset="2"/>
+              <a:buChar char=""/>
+            </a:pPr>
+            <a:r>
+              <a:rPr b="0" lang="en-US" sz="2800" spc="-1" strike="noStrike">
+                <a:solidFill>
+                  <a:srgbClr val="0066cc"/>
+                </a:solidFill>
+                <a:latin typeface="Arial"/>
+              </a:rPr>
+              <a:t>Funkcija vraca u zavisnosti od roditelja rezultujuci skup</a:t>
+            </a:r>
+            <a:endParaRPr b="0" lang="en-US" sz="2800" spc="-1" strike="noStrike">
+              <a:solidFill>
+                <a:srgbClr val="0066cc"/>
+              </a:solidFill>
+              <a:latin typeface="Arial"/>
+            </a:endParaRPr>
+          </a:p>
+        </p:txBody>
+      </p:sp>
+    </p:spTree>
+  </p:cSld>
+  <mc:AlternateContent>
+    <mc:Choice Requires="p14">
+      <p:transition spd="slow" p14:dur="2000"/>
+    </mc:Choice>
+    <mc:Fallback>
+      <p:transition spd="slow"/>
+    </mc:Fallback>
+  </mc:AlternateContent>
+  <p:timing>
+    <p:tnLst>
+      <p:par>
+        <p:cTn id="17" dur="indefinite" restart="never" nodeType="tmRoot">
+          <p:childTnLst>
+            <p:seq>
+              <p:cTn id="18" dur="indefinite" nodeType="mainSeq"/>
+              <p:prevCondLst>
+                <p:cond delay="0" evt="onPrev">
+                  <p:tgtEl>
+                    <p:sldTgt/>
+                  </p:tgtEl>
+                </p:cond>
+              </p:prevCondLst>
+              <p:nextCondLst>
+                <p:cond delay="0" evt="onNext">
+                  <p:tgtEl>
+                    <p:sldTgt/>
+                  </p:tgtEl>
+                </p:cond>
+              </p:nextCondLst>
+            </p:seq>
+          </p:childTnLst>
+        </p:cTn>
+      </p:par>
+    </p:tnLst>
+  </p:timing>
+</p:sld>
+</file>
+
+<file path=ppt/slides/slide19.xml><?xml version="1.0" encoding="utf-8"?>
+<p:sld xmlns:a="http://schemas.openxmlformats.org/drawingml/2006/main" xmlns:p="http://schemas.openxmlformats.org/presentationml/2006/main" xmlns:r="http://schemas.openxmlformats.org/officeDocument/2006/relationships" xmlns:p14="http://schemas.microsoft.com/office/powerpoint/2010/main" xmlns:p15="http://schemas.microsoft.com/office/powerpoint/2012/main" xmlns:mc="http://schemas.openxmlformats.org/markup-compatibility/2006">
+  <p:cSld>
+    <p:spTree>
+      <p:nvGrpSpPr>
+        <p:cNvPr id="1" name=""/>
+        <p:cNvGrpSpPr/>
+        <p:nvPr/>
+      </p:nvGrpSpPr>
+      <p:grpSpPr>
+        <a:xfrm>
+          <a:off x="0" y="0"/>
+          <a:ext cx="0" cy="0"/>
+          <a:chOff x="0" y="0"/>
+          <a:chExt cx="0" cy="0"/>
+        </a:xfrm>
+      </p:grpSpPr>
+      <p:sp>
+        <p:nvSpPr>
+          <p:cNvPr id="139" name="TextShape 1"/>
+          <p:cNvSpPr txBox="1"/>
+          <p:nvPr/>
+        </p:nvSpPr>
+        <p:spPr>
+          <a:xfrm>
+            <a:off x="504000" y="301320"/>
+            <a:ext cx="9071640" cy="637560"/>
+          </a:xfrm>
+          <a:prstGeom prst="rect">
+            <a:avLst/>
+          </a:prstGeom>
+          <a:noFill/>
+          <a:ln>
+            <a:noFill/>
+          </a:ln>
+        </p:spPr>
+        <p:txBody>
+          <a:bodyPr lIns="0" rIns="0" tIns="0" bIns="0" anchor="ctr">
+            <a:spAutoFit/>
+          </a:bodyPr>
+          <a:p>
+            <a:pPr algn="ctr"/>
+            <a:r>
+              <a:rPr b="0" lang="en-US" sz="4400" spc="-1" strike="noStrike">
+                <a:solidFill>
+                  <a:srgbClr val="ffffff"/>
+                </a:solidFill>
+                <a:latin typeface="Arial"/>
+              </a:rPr>
+              <a:t>Napredna pretraga</a:t>
+            </a:r>
+            <a:endParaRPr b="0" lang="en-US" sz="4400" spc="-1" strike="noStrike">
+              <a:solidFill>
+                <a:srgbClr val="ffffff"/>
+              </a:solidFill>
+              <a:latin typeface="Arial"/>
+            </a:endParaRPr>
+          </a:p>
+        </p:txBody>
+      </p:sp>
+      <p:sp>
+        <p:nvSpPr>
+          <p:cNvPr id="140" name="TextShape 2"/>
+          <p:cNvSpPr txBox="1"/>
+          <p:nvPr/>
+        </p:nvSpPr>
+        <p:spPr>
+          <a:xfrm>
+            <a:off x="504000" y="1769040"/>
+            <a:ext cx="9071640" cy="4384440"/>
+          </a:xfrm>
+          <a:prstGeom prst="rect">
+            <a:avLst/>
+          </a:prstGeom>
+          <a:noFill/>
+          <a:ln>
+            <a:noFill/>
+          </a:ln>
+        </p:spPr>
+        <p:txBody>
+          <a:bodyPr lIns="0" rIns="0" tIns="0" bIns="0">
+            <a:noAutofit/>
+          </a:bodyPr>
+          <a:p>
+            <a:pPr marL="432000" indent="-324000">
+              <a:spcBef>
+                <a:spcPts val="1417"/>
+              </a:spcBef>
+              <a:buClr>
+                <a:srgbClr val="000000"/>
+              </a:buClr>
+              <a:buSzPct val="45000"/>
+              <a:buFont typeface="Wingdings" charset="2"/>
+              <a:buChar char=""/>
+            </a:pPr>
+            <a:r>
+              <a:rPr b="0" lang="en-US" sz="3200" spc="-1" strike="noStrike">
+                <a:solidFill>
+                  <a:srgbClr val="0066cc"/>
+                </a:solidFill>
+                <a:latin typeface="Arial"/>
+              </a:rPr>
+              <a:t>Evaluacija stabla:</a:t>
+            </a:r>
+            <a:endParaRPr b="0" lang="en-US" sz="3200" spc="-1" strike="noStrike">
+              <a:solidFill>
+                <a:srgbClr val="0066cc"/>
+              </a:solidFill>
+              <a:latin typeface="Arial"/>
+            </a:endParaRPr>
+          </a:p>
+          <a:p>
+            <a:pPr lvl="1" marL="864000" indent="-324000">
+              <a:spcBef>
+                <a:spcPts val="1134"/>
+              </a:spcBef>
+              <a:buClr>
+                <a:srgbClr val="000000"/>
+              </a:buClr>
+              <a:buSzPct val="75000"/>
+              <a:buFont typeface="Symbol" charset="2"/>
+              <a:buChar char=""/>
+            </a:pPr>
+            <a:r>
+              <a:rPr b="0" lang="en-US" sz="2800" spc="-1" strike="noStrike">
+                <a:solidFill>
+                  <a:srgbClr val="0066cc"/>
+                </a:solidFill>
+                <a:latin typeface="Arial"/>
+              </a:rPr>
+              <a:t>Pseudokod:</a:t>
+            </a:r>
+            <a:endParaRPr b="0" lang="en-US" sz="2800" spc="-1" strike="noStrike">
+              <a:solidFill>
+                <a:srgbClr val="0066cc"/>
+              </a:solidFill>
+              <a:latin typeface="Arial"/>
+            </a:endParaRPr>
+          </a:p>
+        </p:txBody>
+      </p:sp>
+      <p:sp>
+        <p:nvSpPr>
+          <p:cNvPr id="141" name="TextShape 3"/>
+          <p:cNvSpPr txBox="1"/>
+          <p:nvPr/>
+        </p:nvSpPr>
+        <p:spPr>
+          <a:xfrm>
+            <a:off x="3840480" y="2377440"/>
+            <a:ext cx="7315200" cy="4441680"/>
+          </a:xfrm>
+          <a:prstGeom prst="rect">
+            <a:avLst/>
+          </a:prstGeom>
+          <a:noFill/>
+          <a:ln>
+            <a:noFill/>
+          </a:ln>
+        </p:spPr>
+        <p:txBody>
+          <a:bodyPr lIns="90000" rIns="90000" tIns="45000" bIns="45000">
+            <a:spAutoFit/>
+          </a:bodyPr>
+          <a:p>
+            <a:r>
+              <a:rPr b="0" lang="en-US" sz="1800" spc="-1" strike="noStrike">
+                <a:latin typeface="Arial"/>
+              </a:rPr>
+              <a:t>evaluate(tree):</a:t>
+            </a:r>
+            <a:endParaRPr b="0" lang="en-US" sz="1800" spc="-1" strike="noStrike">
+              <a:latin typeface="Arial"/>
+            </a:endParaRPr>
+          </a:p>
+          <a:p>
+            <a:r>
+              <a:rPr b="0" lang="en-US" sz="1800" spc="-1" strike="noStrike">
+                <a:latin typeface="Arial"/>
+              </a:rPr>
+              <a:t>	</a:t>
+            </a:r>
+            <a:r>
+              <a:rPr b="0" lang="en-US" sz="1800" spc="-1" strike="noStrike">
+                <a:latin typeface="Arial"/>
+              </a:rPr>
+              <a:t>if tree.left is None and tree.right is None:</a:t>
+            </a:r>
+            <a:endParaRPr b="0" lang="en-US" sz="1800" spc="-1" strike="noStrike">
+              <a:latin typeface="Arial"/>
+            </a:endParaRPr>
+          </a:p>
+          <a:p>
+            <a:r>
+              <a:rPr b="0" lang="en-US" sz="1800" spc="-1" strike="noStrike">
+                <a:latin typeface="Arial"/>
+              </a:rPr>
+              <a:t>	</a:t>
+            </a:r>
+            <a:r>
+              <a:rPr b="0" lang="en-US" sz="1800" spc="-1" strike="noStrike">
+                <a:latin typeface="Arial"/>
+              </a:rPr>
+              <a:t>	</a:t>
+            </a:r>
+            <a:r>
+              <a:rPr b="0" lang="en-US" sz="1800" spc="-1" strike="noStrike">
+                <a:latin typeface="Arial"/>
+              </a:rPr>
+              <a:t>result_set = find_by_word(tree.word)</a:t>
+            </a:r>
+            <a:endParaRPr b="0" lang="en-US" sz="1800" spc="-1" strike="noStrike">
+              <a:latin typeface="Arial"/>
+            </a:endParaRPr>
+          </a:p>
+          <a:p>
+            <a:r>
+              <a:rPr b="0" lang="en-US" sz="1800" spc="-1" strike="noStrike">
+                <a:latin typeface="Arial"/>
+              </a:rPr>
+              <a:t>	</a:t>
+            </a:r>
+            <a:r>
+              <a:rPr b="0" lang="en-US" sz="1800" spc="-1" strike="noStrike">
+                <a:latin typeface="Arial"/>
+              </a:rPr>
+              <a:t>	</a:t>
+            </a:r>
+            <a:r>
+              <a:rPr b="0" lang="en-US" sz="1800" spc="-1" strike="noStrike">
+                <a:latin typeface="Arial"/>
+              </a:rPr>
+              <a:t>return result_set</a:t>
+            </a:r>
+            <a:endParaRPr b="0" lang="en-US" sz="1800" spc="-1" strike="noStrike">
+              <a:latin typeface="Arial"/>
+            </a:endParaRPr>
+          </a:p>
+          <a:p>
+            <a:r>
+              <a:rPr b="0" lang="en-US" sz="1800" spc="-1" strike="noStrike">
+                <a:latin typeface="Arial"/>
+              </a:rPr>
+              <a:t>	</a:t>
+            </a:r>
+            <a:r>
+              <a:rPr b="0" lang="en-US" sz="1800" spc="-1" strike="noStrike">
+                <a:latin typeface="Arial"/>
+              </a:rPr>
+              <a:t>else:</a:t>
+            </a:r>
+            <a:endParaRPr b="0" lang="en-US" sz="1800" spc="-1" strike="noStrike">
+              <a:latin typeface="Arial"/>
+            </a:endParaRPr>
+          </a:p>
+          <a:p>
+            <a:r>
+              <a:rPr b="0" lang="en-US" sz="1800" spc="-1" strike="noStrike">
+                <a:latin typeface="Arial"/>
+              </a:rPr>
+              <a:t>	</a:t>
+            </a:r>
+            <a:r>
+              <a:rPr b="0" lang="en-US" sz="1800" spc="-1" strike="noStrike">
+                <a:latin typeface="Arial"/>
+              </a:rPr>
+              <a:t>	</a:t>
+            </a:r>
+            <a:r>
+              <a:rPr b="0" lang="en-US" sz="1800" spc="-1" strike="noStrike">
+                <a:latin typeface="Arial"/>
+              </a:rPr>
+              <a:t>return empty_set</a:t>
+            </a:r>
+            <a:endParaRPr b="0" lang="en-US" sz="1800" spc="-1" strike="noStrike">
+              <a:latin typeface="Arial"/>
+            </a:endParaRPr>
+          </a:p>
+          <a:p>
+            <a:r>
+              <a:rPr b="0" lang="en-US" sz="1800" spc="-1" strike="noStrike">
+                <a:latin typeface="Arial"/>
+              </a:rPr>
+              <a:t>	</a:t>
+            </a:r>
+            <a:r>
+              <a:rPr b="0" lang="en-US" sz="1800" spc="-1" strike="noStrike">
+                <a:latin typeface="Arial"/>
+              </a:rPr>
+              <a:t>evaluate(tree.left)</a:t>
+            </a:r>
+            <a:endParaRPr b="0" lang="en-US" sz="1800" spc="-1" strike="noStrike">
+              <a:latin typeface="Arial"/>
+            </a:endParaRPr>
+          </a:p>
+          <a:p>
+            <a:r>
+              <a:rPr b="0" lang="en-US" sz="1800" spc="-1" strike="noStrike">
+                <a:latin typeface="Arial"/>
+              </a:rPr>
+              <a:t>	</a:t>
+            </a:r>
+            <a:r>
+              <a:rPr b="0" lang="en-US" sz="1800" spc="-1" strike="noStrike">
+                <a:latin typeface="Arial"/>
+              </a:rPr>
+              <a:t>evaluate(tree.right)</a:t>
+            </a:r>
+            <a:endParaRPr b="0" lang="en-US" sz="1800" spc="-1" strike="noStrike">
+              <a:latin typeface="Arial"/>
+            </a:endParaRPr>
+          </a:p>
+          <a:p>
+            <a:r>
+              <a:rPr b="0" lang="en-US" sz="1800" spc="-1" strike="noStrike">
+                <a:latin typeface="Arial"/>
+              </a:rPr>
+              <a:t>	</a:t>
+            </a:r>
+            <a:endParaRPr b="0" lang="en-US" sz="1800" spc="-1" strike="noStrike">
+              <a:latin typeface="Arial"/>
+            </a:endParaRPr>
+          </a:p>
+          <a:p>
+            <a:r>
+              <a:rPr b="0" lang="en-US" sz="1800" spc="-1" strike="noStrike">
+                <a:latin typeface="Arial"/>
+              </a:rPr>
+              <a:t>	</a:t>
+            </a:r>
+            <a:r>
+              <a:rPr b="0" lang="en-US" sz="1800" spc="-1" strike="noStrike">
+                <a:latin typeface="Arial"/>
+              </a:rPr>
+              <a:t>if tree.word == ‘&amp;&amp;’:</a:t>
+            </a:r>
+            <a:endParaRPr b="0" lang="en-US" sz="1800" spc="-1" strike="noStrike">
+              <a:latin typeface="Arial"/>
+            </a:endParaRPr>
+          </a:p>
+          <a:p>
+            <a:r>
+              <a:rPr b="0" lang="en-US" sz="1800" spc="-1" strike="noStrike">
+                <a:latin typeface="Arial"/>
+              </a:rPr>
+              <a:t>	</a:t>
+            </a:r>
+            <a:r>
+              <a:rPr b="0" lang="en-US" sz="1800" spc="-1" strike="noStrike">
+                <a:latin typeface="Arial"/>
+              </a:rPr>
+              <a:t>	</a:t>
+            </a:r>
+            <a:r>
+              <a:rPr b="0" lang="en-US" sz="1800" spc="-1" strike="noStrike">
+                <a:latin typeface="Arial"/>
+              </a:rPr>
+              <a:t>return tree.left &amp;&amp; tree.right</a:t>
+            </a:r>
+            <a:endParaRPr b="0" lang="en-US" sz="1800" spc="-1" strike="noStrike">
+              <a:latin typeface="Arial"/>
+            </a:endParaRPr>
+          </a:p>
+          <a:p>
+            <a:r>
+              <a:rPr b="0" lang="en-US" sz="1800" spc="-1" strike="noStrike">
+                <a:latin typeface="Arial"/>
+              </a:rPr>
+              <a:t>	</a:t>
+            </a:r>
+            <a:r>
+              <a:rPr b="0" lang="en-US" sz="1800" spc="-1" strike="noStrike">
+                <a:latin typeface="Arial"/>
+              </a:rPr>
+              <a:t>else if tree.word == ‘||’:</a:t>
+            </a:r>
+            <a:endParaRPr b="0" lang="en-US" sz="1800" spc="-1" strike="noStrike">
+              <a:latin typeface="Arial"/>
+            </a:endParaRPr>
+          </a:p>
+          <a:p>
+            <a:r>
+              <a:rPr b="0" lang="en-US" sz="1800" spc="-1" strike="noStrike">
+                <a:latin typeface="Arial"/>
+              </a:rPr>
+              <a:t>	</a:t>
+            </a:r>
+            <a:r>
+              <a:rPr b="0" lang="en-US" sz="1800" spc="-1" strike="noStrike">
+                <a:latin typeface="Arial"/>
+              </a:rPr>
+              <a:t>	</a:t>
+            </a:r>
+            <a:r>
+              <a:rPr b="0" lang="en-US" sz="1800" spc="-1" strike="noStrike">
+                <a:latin typeface="Arial"/>
+              </a:rPr>
+              <a:t>return tree.left || tree.right</a:t>
+            </a:r>
+            <a:endParaRPr b="0" lang="en-US" sz="1800" spc="-1" strike="noStrike">
+              <a:latin typeface="Arial"/>
+            </a:endParaRPr>
+          </a:p>
+          <a:p>
+            <a:r>
+              <a:rPr b="0" lang="en-US" sz="1800" spc="-1" strike="noStrike">
+                <a:latin typeface="Arial"/>
+              </a:rPr>
+              <a:t>	</a:t>
+            </a:r>
+            <a:r>
+              <a:rPr b="0" lang="en-US" sz="1800" spc="-1" strike="noStrike">
+                <a:latin typeface="Arial"/>
+              </a:rPr>
+              <a:t>else:</a:t>
+            </a:r>
+            <a:endParaRPr b="0" lang="en-US" sz="1800" spc="-1" strike="noStrike">
+              <a:latin typeface="Arial"/>
+            </a:endParaRPr>
+          </a:p>
+          <a:p>
+            <a:r>
+              <a:rPr b="0" lang="en-US" sz="1800" spc="-1" strike="noStrike">
+                <a:latin typeface="Arial"/>
+              </a:rPr>
+              <a:t>	</a:t>
+            </a:r>
+            <a:r>
+              <a:rPr b="0" lang="en-US" sz="1800" spc="-1" strike="noStrike">
+                <a:latin typeface="Arial"/>
+              </a:rPr>
+              <a:t>	</a:t>
+            </a:r>
+            <a:r>
+              <a:rPr b="0" lang="en-US" sz="1800" spc="-1" strike="noStrike">
+                <a:latin typeface="Arial"/>
+              </a:rPr>
+              <a:t>return tree.left.komplement</a:t>
+            </a:r>
+            <a:endParaRPr b="0" lang="en-US" sz="1800" spc="-1" strike="noStrike">
+              <a:latin typeface="Arial"/>
+            </a:endParaRPr>
+          </a:p>
+          <a:p>
+            <a:endParaRPr b="0" lang="en-US" sz="1800" spc="-1" strike="noStrike">
+              <a:latin typeface="Arial"/>
+            </a:endParaRPr>
+          </a:p>
+          <a:p>
+            <a:endParaRPr b="0" lang="en-US" sz="1800" spc="-1" strike="noStrike">
               <a:latin typeface="Arial"/>
             </a:endParaRPr>
           </a:p>
@@ -4456,6 +7522,234 @@
           <p:childTnLst>
             <p:seq>
               <p:cTn id="2" dur="indefinite" nodeType="mainSeq"/>
+              <p:prevCondLst>
+                <p:cond delay="0" evt="onPrev">
+                  <p:tgtEl>
+                    <p:sldTgt/>
+                  </p:tgtEl>
+                </p:cond>
+              </p:prevCondLst>
+              <p:nextCondLst>
+                <p:cond delay="0" evt="onNext">
+                  <p:tgtEl>
+                    <p:sldTgt/>
+                  </p:tgtEl>
+                </p:cond>
+              </p:nextCondLst>
+            </p:seq>
+          </p:childTnLst>
+        </p:cTn>
+      </p:par>
+    </p:tnLst>
+  </p:timing>
+</p:sld>
+</file>
+
+<file path=ppt/slides/slide20.xml><?xml version="1.0" encoding="utf-8"?>
+<p:sld xmlns:a="http://schemas.openxmlformats.org/drawingml/2006/main" xmlns:p="http://schemas.openxmlformats.org/presentationml/2006/main" xmlns:r="http://schemas.openxmlformats.org/officeDocument/2006/relationships" xmlns:p14="http://schemas.microsoft.com/office/powerpoint/2010/main" xmlns:p15="http://schemas.microsoft.com/office/powerpoint/2012/main" xmlns:mc="http://schemas.openxmlformats.org/markup-compatibility/2006">
+  <p:cSld>
+    <p:spTree>
+      <p:nvGrpSpPr>
+        <p:cNvPr id="1" name=""/>
+        <p:cNvGrpSpPr/>
+        <p:nvPr/>
+      </p:nvGrpSpPr>
+      <p:grpSpPr>
+        <a:xfrm>
+          <a:off x="0" y="0"/>
+          <a:ext cx="0" cy="0"/>
+          <a:chOff x="0" y="0"/>
+          <a:chExt cx="0" cy="0"/>
+        </a:xfrm>
+      </p:grpSpPr>
+      <p:sp>
+        <p:nvSpPr>
+          <p:cNvPr id="142" name="TextShape 1"/>
+          <p:cNvSpPr txBox="1"/>
+          <p:nvPr/>
+        </p:nvSpPr>
+        <p:spPr>
+          <a:xfrm>
+            <a:off x="504000" y="301320"/>
+            <a:ext cx="9071640" cy="637560"/>
+          </a:xfrm>
+          <a:prstGeom prst="rect">
+            <a:avLst/>
+          </a:prstGeom>
+          <a:noFill/>
+          <a:ln>
+            <a:noFill/>
+          </a:ln>
+        </p:spPr>
+        <p:txBody>
+          <a:bodyPr lIns="0" rIns="0" tIns="0" bIns="0" anchor="ctr">
+            <a:spAutoFit/>
+          </a:bodyPr>
+          <a:p>
+            <a:pPr algn="ctr"/>
+            <a:r>
+              <a:rPr b="0" lang="en-US" sz="4400" spc="-1" strike="noStrike">
+                <a:solidFill>
+                  <a:srgbClr val="ffffff"/>
+                </a:solidFill>
+                <a:latin typeface="Arial"/>
+              </a:rPr>
+              <a:t>Zavrsne napomene</a:t>
+            </a:r>
+            <a:endParaRPr b="0" lang="en-US" sz="4400" spc="-1" strike="noStrike">
+              <a:solidFill>
+                <a:srgbClr val="ffffff"/>
+              </a:solidFill>
+              <a:latin typeface="Arial"/>
+            </a:endParaRPr>
+          </a:p>
+        </p:txBody>
+      </p:sp>
+      <p:sp>
+        <p:nvSpPr>
+          <p:cNvPr id="143" name="TextShape 2"/>
+          <p:cNvSpPr txBox="1"/>
+          <p:nvPr/>
+        </p:nvSpPr>
+        <p:spPr>
+          <a:xfrm>
+            <a:off x="504000" y="1769040"/>
+            <a:ext cx="9071640" cy="4384440"/>
+          </a:xfrm>
+          <a:prstGeom prst="rect">
+            <a:avLst/>
+          </a:prstGeom>
+          <a:noFill/>
+          <a:ln>
+            <a:noFill/>
+          </a:ln>
+        </p:spPr>
+        <p:txBody>
+          <a:bodyPr lIns="0" rIns="0" tIns="0" bIns="0">
+            <a:noAutofit/>
+          </a:bodyPr>
+          <a:p>
+            <a:pPr marL="432000" indent="-324000">
+              <a:spcBef>
+                <a:spcPts val="1417"/>
+              </a:spcBef>
+              <a:buClr>
+                <a:srgbClr val="000000"/>
+              </a:buClr>
+              <a:buSzPct val="45000"/>
+              <a:buFont typeface="Wingdings" charset="2"/>
+              <a:buChar char=""/>
+            </a:pPr>
+            <a:r>
+              <a:rPr b="0" lang="en-US" sz="3200" spc="-1" strike="noStrike">
+                <a:solidFill>
+                  <a:srgbClr val="0066cc"/>
+                </a:solidFill>
+                <a:latin typeface="Arial"/>
+              </a:rPr>
+              <a:t>os.walk() time complexity:</a:t>
+            </a:r>
+            <a:endParaRPr b="0" lang="en-US" sz="3200" spc="-1" strike="noStrike">
+              <a:solidFill>
+                <a:srgbClr val="0066cc"/>
+              </a:solidFill>
+              <a:latin typeface="Arial"/>
+            </a:endParaRPr>
+          </a:p>
+          <a:p>
+            <a:pPr lvl="1" marL="864000" indent="-324000">
+              <a:spcBef>
+                <a:spcPts val="1134"/>
+              </a:spcBef>
+              <a:buClr>
+                <a:srgbClr val="000000"/>
+              </a:buClr>
+              <a:buSzPct val="75000"/>
+              <a:buFont typeface="Symbol" charset="2"/>
+              <a:buChar char=""/>
+            </a:pPr>
+            <a:r>
+              <a:rPr b="0" lang="en-US" sz="2800" spc="-1" strike="noStrike">
+                <a:solidFill>
+                  <a:srgbClr val="0066cc"/>
+                </a:solidFill>
+                <a:latin typeface="Arial"/>
+              </a:rPr>
+              <a:t>Vreme izvrsavanja os.walk() zavisi od broja fajlova u datom direktorijumu - n. </a:t>
+            </a:r>
+            <a:endParaRPr b="0" lang="en-US" sz="2800" spc="-1" strike="noStrike">
+              <a:solidFill>
+                <a:srgbClr val="0066cc"/>
+              </a:solidFill>
+              <a:latin typeface="Arial"/>
+            </a:endParaRPr>
+          </a:p>
+          <a:p>
+            <a:pPr lvl="1" marL="864000" indent="-324000">
+              <a:spcBef>
+                <a:spcPts val="1134"/>
+              </a:spcBef>
+              <a:buClr>
+                <a:srgbClr val="000000"/>
+              </a:buClr>
+              <a:buSzPct val="75000"/>
+              <a:buFont typeface="Symbol" charset="2"/>
+              <a:buChar char=""/>
+            </a:pPr>
+            <a:r>
+              <a:rPr b="0" lang="en-US" sz="2800" spc="-1" strike="noStrike">
+                <a:solidFill>
+                  <a:srgbClr val="0066cc"/>
+                </a:solidFill>
+                <a:latin typeface="Arial"/>
+              </a:rPr>
+              <a:t>U nasem programu takodje zavisi od broja reci po jednoj html stranici – m.</a:t>
+            </a:r>
+            <a:endParaRPr b="0" lang="en-US" sz="2800" spc="-1" strike="noStrike">
+              <a:solidFill>
+                <a:srgbClr val="0066cc"/>
+              </a:solidFill>
+              <a:latin typeface="Arial"/>
+            </a:endParaRPr>
+          </a:p>
+          <a:p>
+            <a:pPr lvl="1" marL="864000" indent="-324000">
+              <a:spcBef>
+                <a:spcPts val="1134"/>
+              </a:spcBef>
+              <a:buClr>
+                <a:srgbClr val="000000"/>
+              </a:buClr>
+              <a:buSzPct val="75000"/>
+              <a:buFont typeface="Symbol" charset="2"/>
+              <a:buChar char=""/>
+            </a:pPr>
+            <a:endParaRPr b="0" lang="en-US" sz="2800" spc="-1" strike="noStrike">
+              <a:solidFill>
+                <a:srgbClr val="0066cc"/>
+              </a:solidFill>
+              <a:latin typeface="Arial"/>
+            </a:endParaRPr>
+          </a:p>
+        </p:txBody>
+      </p:sp>
+    </p:spTree>
+  </p:cSld>
+  <mc:AlternateContent>
+    <mc:Choice Requires="p14">
+      <p:transition spd="slow" p14:dur="2000"/>
+    </mc:Choice>
+    <mc:Fallback>
+      <p:transition spd="slow"/>
+    </mc:Fallback>
+  </mc:AlternateContent>
+  <p:timing>
+    <p:tnLst>
+      <p:par>
+        <p:cTn id="19" dur="indefinite" restart="never" nodeType="tmRoot">
+          <p:childTnLst>
+            <p:seq>
+              <p:cTn id="20" dur="indefinite" nodeType="mainSeq"/>
               <p:prevCondLst>
                 <p:cond delay="0" evt="onPrev">
                   <p:tgtEl>

</xml_diff>